<commit_message>
Ajout modèle geogebra + Powerpoint
</commit_message>
<xml_diff>
--- a/Présentation projet/Projet ISN.pptx
+++ b/Présentation projet/Projet ISN.pptx
@@ -163,20 +163,6 @@
 </p:cmAuthorLst>
 </file>
 
-<file path=ppt/comments/comment1.xml><?xml version="1.0" encoding="utf-8"?>
-<p:cmLst xmlns:a="http://schemas.openxmlformats.org/drawingml/2006/main" xmlns:r="http://schemas.openxmlformats.org/officeDocument/2006/relationships" xmlns:p="http://schemas.openxmlformats.org/presentationml/2006/main">
-  <p:cm authorId="2" dt="2018-02-06T22:18:16.087" idx="1">
-    <p:pos x="5449" y="671"/>
-    <p:text/>
-    <p:extLst>
-      <p:ext uri="{C676402C-5697-4E1C-873F-D02D1690AC5C}">
-        <p15:threadingInfo xmlns:p15="http://schemas.microsoft.com/office/powerpoint/2012/main" timeZoneBias="-60"/>
-      </p:ext>
-    </p:extLst>
-  </p:cm>
-</p:cmLst>
-</file>
-
 <file path=ppt/handoutMasters/handoutMaster1.xml><?xml version="1.0" encoding="utf-8"?>
 <p:handoutMaster xmlns:a="http://schemas.openxmlformats.org/drawingml/2006/main" xmlns:r="http://schemas.openxmlformats.org/officeDocument/2006/relationships" xmlns:p="http://schemas.openxmlformats.org/presentationml/2006/main">
   <p:cSld>
@@ -258,7 +244,7 @@
           </a:lstStyle>
           <a:p>
             <a:fld id="{4B230A23-3E98-F64D-859B-DE462771A158}" type="datetimeFigureOut">
-              <a:t>06/02/2018</a:t>
+              <a:t>07/02/2018</a:t>
             </a:fld>
             <a:endParaRPr lang="fr-FR"/>
           </a:p>
@@ -571,7 +557,7 @@
             <a:fld id="{5BBF241E-D95D-F947-BD40-BA0B1092A59D}" type="datetimeFigureOut">
               <a:rPr lang="fr-FR" smtClean="0"/>
               <a:pPr/>
-              <a:t>06/02/2018</a:t>
+              <a:t>07/02/2018</a:t>
             </a:fld>
             <a:endParaRPr lang="fr-FR"/>
           </a:p>
@@ -843,7 +829,7 @@
             <a:fld id="{5BBF241E-D95D-F947-BD40-BA0B1092A59D}" type="datetimeFigureOut">
               <a:rPr lang="fr-FR" smtClean="0"/>
               <a:pPr/>
-              <a:t>06/02/2018</a:t>
+              <a:t>07/02/2018</a:t>
             </a:fld>
             <a:endParaRPr lang="fr-FR"/>
           </a:p>
@@ -1116,7 +1102,7 @@
             <a:fld id="{5BBF241E-D95D-F947-BD40-BA0B1092A59D}" type="datetimeFigureOut">
               <a:rPr lang="fr-FR" smtClean="0"/>
               <a:pPr/>
-              <a:t>06/02/2018</a:t>
+              <a:t>07/02/2018</a:t>
             </a:fld>
             <a:endParaRPr lang="fr-FR"/>
           </a:p>
@@ -1346,7 +1332,7 @@
             <a:fld id="{5BBF241E-D95D-F947-BD40-BA0B1092A59D}" type="datetimeFigureOut">
               <a:rPr lang="fr-FR" smtClean="0"/>
               <a:pPr/>
-              <a:t>06/02/2018</a:t>
+              <a:t>07/02/2018</a:t>
             </a:fld>
             <a:endParaRPr lang="fr-FR"/>
           </a:p>
@@ -1721,7 +1707,7 @@
             <a:fld id="{5BBF241E-D95D-F947-BD40-BA0B1092A59D}" type="datetimeFigureOut">
               <a:rPr lang="fr-FR" smtClean="0"/>
               <a:pPr/>
-              <a:t>06/02/2018</a:t>
+              <a:t>07/02/2018</a:t>
             </a:fld>
             <a:endParaRPr lang="fr-FR"/>
           </a:p>
@@ -2065,7 +2051,7 @@
             <a:fld id="{5BBF241E-D95D-F947-BD40-BA0B1092A59D}" type="datetimeFigureOut">
               <a:rPr lang="fr-FR" smtClean="0"/>
               <a:pPr/>
-              <a:t>06/02/2018</a:t>
+              <a:t>07/02/2018</a:t>
             </a:fld>
             <a:endParaRPr lang="fr-FR"/>
           </a:p>
@@ -2584,7 +2570,7 @@
             <a:fld id="{5BBF241E-D95D-F947-BD40-BA0B1092A59D}" type="datetimeFigureOut">
               <a:rPr lang="fr-FR" smtClean="0"/>
               <a:pPr/>
-              <a:t>06/02/2018</a:t>
+              <a:t>07/02/2018</a:t>
             </a:fld>
             <a:endParaRPr lang="fr-FR"/>
           </a:p>
@@ -2859,7 +2845,7 @@
             <a:fld id="{5BBF241E-D95D-F947-BD40-BA0B1092A59D}" type="datetimeFigureOut">
               <a:rPr lang="fr-FR" smtClean="0"/>
               <a:pPr/>
-              <a:t>06/02/2018</a:t>
+              <a:t>07/02/2018</a:t>
             </a:fld>
             <a:endParaRPr lang="fr-FR"/>
           </a:p>
@@ -3100,7 +3086,7 @@
             <a:fld id="{5BBF241E-D95D-F947-BD40-BA0B1092A59D}" type="datetimeFigureOut">
               <a:rPr lang="fr-FR" smtClean="0"/>
               <a:pPr/>
-              <a:t>06/02/2018</a:t>
+              <a:t>07/02/2018</a:t>
             </a:fld>
             <a:endParaRPr lang="fr-FR"/>
           </a:p>
@@ -3282,7 +3268,7 @@
             <a:fld id="{5BBF241E-D95D-F947-BD40-BA0B1092A59D}" type="datetimeFigureOut">
               <a:rPr lang="fr-FR" smtClean="0"/>
               <a:pPr/>
-              <a:t>06/02/2018</a:t>
+              <a:t>07/02/2018</a:t>
             </a:fld>
             <a:endParaRPr lang="fr-FR"/>
           </a:p>
@@ -3629,7 +3615,7 @@
             <a:fld id="{5BBF241E-D95D-F947-BD40-BA0B1092A59D}" type="datetimeFigureOut">
               <a:rPr lang="fr-FR" smtClean="0"/>
               <a:pPr/>
-              <a:t>06/02/2018</a:t>
+              <a:t>07/02/2018</a:t>
             </a:fld>
             <a:endParaRPr lang="fr-FR"/>
           </a:p>
@@ -5049,7 +5035,7 @@
         </p:blipFill>
         <p:spPr>
           <a:xfrm>
-            <a:off x="2399664" y="1119188"/>
+            <a:off x="3874826" y="1265238"/>
             <a:ext cx="4212909" cy="3395662"/>
           </a:xfrm>
         </p:spPr>
@@ -5439,8 +5425,8 @@
           </a:p>
         </p:txBody>
       </p:sp>
-      <mc:AlternateContent xmlns:mc="http://schemas.openxmlformats.org/markup-compatibility/2006">
-        <mc:Choice xmlns:a14="http://schemas.microsoft.com/office/drawing/2010/main" Requires="a14">
+      <mc:AlternateContent xmlns:mc="http://schemas.openxmlformats.org/markup-compatibility/2006" xmlns:a14="http://schemas.microsoft.com/office/drawing/2010/main">
+        <mc:Choice Requires="a14">
           <p:sp>
             <p:nvSpPr>
               <p:cNvPr id="9" name="ZoneTexte 8">
@@ -5469,6 +5455,7 @@
               </a:bodyPr>
               <a:lstStyle/>
               <a:p>
+                <a:pPr/>
                 <a:r>
                   <a:rPr lang="fr-FR" b="1" dirty="0">
                     <a:latin typeface="Segoe UI" panose="020B0502040204020203" pitchFamily="34" charset="0"/>
@@ -5550,7 +5537,7 @@
                       <m:accPr>
                         <m:chr m:val="⃗"/>
                         <m:ctrlPr>
-                          <a:rPr lang="fr-FR" b="1" dirty="0" smtClean="0">
+                          <a:rPr lang="fr-FR" b="1" i="1" dirty="0" smtClean="0">
                             <a:latin typeface="Cambria Math" panose="02040503050406030204" pitchFamily="18" charset="0"/>
                           </a:rPr>
                         </m:ctrlPr>
@@ -6006,7 +5993,7 @@
             </p:txBody>
           </p:sp>
         </mc:Choice>
-        <mc:Fallback>
+        <mc:Fallback xmlns="">
           <p:sp>
             <p:nvSpPr>
               <p:cNvPr id="9" name="ZoneTexte 8">
@@ -6068,7 +6055,7 @@
             <p:spPr>
               <a:xfrm>
                 <a:off x="4972050" y="2207275"/>
-                <a:ext cx="3810000" cy="1651991"/>
+                <a:ext cx="3810000" cy="1649169"/>
               </a:xfrm>
               <a:prstGeom prst="rect">
                 <a:avLst/>
@@ -6139,66 +6126,86 @@
                 </a:r>
                 <a14:m>
                   <m:oMath xmlns:m="http://schemas.openxmlformats.org/officeDocument/2006/math">
-                    <m:acc>
-                      <m:accPr>
-                        <m:chr m:val="⃗"/>
+                    <m:d>
+                      <m:dPr>
+                        <m:begChr m:val="‖"/>
+                        <m:endChr m:val="‖"/>
                         <m:ctrlPr>
                           <a:rPr lang="fr-FR" b="0" i="1" smtClean="0">
                             <a:latin typeface="Cambria Math" panose="02040503050406030204" pitchFamily="18" charset="0"/>
                           </a:rPr>
                         </m:ctrlPr>
-                      </m:accPr>
+                      </m:dPr>
                       <m:e>
+                        <m:acc>
+                          <m:accPr>
+                            <m:chr m:val="⃗"/>
+                            <m:ctrlPr>
+                              <a:rPr lang="fr-FR" b="0" i="1" smtClean="0">
+                                <a:latin typeface="Cambria Math" panose="02040503050406030204" pitchFamily="18" charset="0"/>
+                              </a:rPr>
+                            </m:ctrlPr>
+                          </m:accPr>
+                          <m:e>
+                            <m:r>
+                              <a:rPr lang="fr-FR" b="0" i="1" smtClean="0">
+                                <a:latin typeface="Cambria Math" panose="02040503050406030204" pitchFamily="18" charset="0"/>
+                              </a:rPr>
+                              <m:t>𝐴𝐵</m:t>
+                            </m:r>
+                          </m:e>
+                        </m:acc>
                         <m:r>
                           <a:rPr lang="fr-FR" b="0" i="1" smtClean="0">
                             <a:latin typeface="Cambria Math" panose="02040503050406030204" pitchFamily="18" charset="0"/>
                           </a:rPr>
-                          <m:t>𝐴𝐵</m:t>
+                          <m:t> </m:t>
                         </m:r>
+                        <m:r>
+                          <a:rPr lang="fr-FR" b="0" i="1" smtClean="0">
+                            <a:latin typeface="Cambria Math" panose="02040503050406030204" pitchFamily="18" charset="0"/>
+                            <a:ea typeface="Cambria Math" panose="02040503050406030204" pitchFamily="18" charset="0"/>
+                          </a:rPr>
+                          <m:t>∧</m:t>
+                        </m:r>
+                        <m:acc>
+                          <m:accPr>
+                            <m:chr m:val="⃗"/>
+                            <m:ctrlPr>
+                              <a:rPr lang="fr-FR" i="1">
+                                <a:latin typeface="Cambria Math" panose="02040503050406030204" pitchFamily="18" charset="0"/>
+                                <a:ea typeface="Cambria Math" panose="02040503050406030204" pitchFamily="18" charset="0"/>
+                              </a:rPr>
+                            </m:ctrlPr>
+                          </m:accPr>
+                          <m:e>
+                            <m:r>
+                              <a:rPr lang="fr-FR" i="1">
+                                <a:latin typeface="Cambria Math" panose="02040503050406030204" pitchFamily="18" charset="0"/>
+                                <a:ea typeface="Cambria Math" panose="02040503050406030204" pitchFamily="18" charset="0"/>
+                              </a:rPr>
+                              <m:t>𝐴𝐷</m:t>
+                            </m:r>
+                          </m:e>
+                        </m:acc>
                       </m:e>
-                    </m:acc>
+                    </m:d>
                     <m:r>
                       <a:rPr lang="fr-FR" b="0" i="1" smtClean="0">
                         <a:latin typeface="Cambria Math" panose="02040503050406030204" pitchFamily="18" charset="0"/>
                         <a:ea typeface="Cambria Math" panose="02040503050406030204" pitchFamily="18" charset="0"/>
                       </a:rPr>
-                      <m:t>∧ </m:t>
+                      <m:t> </m:t>
                     </m:r>
-                    <m:acc>
-                      <m:accPr>
-                        <m:chr m:val="⃗"/>
-                        <m:ctrlPr>
-                          <a:rPr lang="fr-FR" b="0" i="1" smtClean="0">
-                            <a:latin typeface="Cambria Math" panose="02040503050406030204" pitchFamily="18" charset="0"/>
-                            <a:ea typeface="Cambria Math" panose="02040503050406030204" pitchFamily="18" charset="0"/>
-                          </a:rPr>
-                        </m:ctrlPr>
-                      </m:accPr>
-                      <m:e>
-                        <m:r>
-                          <a:rPr lang="fr-FR" b="0" i="1" smtClean="0">
-                            <a:latin typeface="Cambria Math" panose="02040503050406030204" pitchFamily="18" charset="0"/>
-                            <a:ea typeface="Cambria Math" panose="02040503050406030204" pitchFamily="18" charset="0"/>
-                          </a:rPr>
-                          <m:t>𝐴𝐷</m:t>
-                        </m:r>
-                      </m:e>
-                    </m:acc>
                   </m:oMath>
                 </a14:m>
                 <a:r>
-                  <a:rPr lang="fr-FR" b="1" dirty="0">
-                    <a:latin typeface="Segoe UI" panose="020B0502040204020203" pitchFamily="34" charset="0"/>
-                    <a:cs typeface="Segoe UI" panose="020B0502040204020203" pitchFamily="34" charset="0"/>
+                  <a:rPr lang="fr-FR" dirty="0">
+                    <a:latin typeface="Segoe UI Semilight" panose="020B0402040204020203" pitchFamily="34" charset="0"/>
+                    <a:cs typeface="Segoe UI Semilight" panose="020B0402040204020203" pitchFamily="34" charset="0"/>
                   </a:rPr>
-                  <a:t> </a:t>
+                  <a:t>Ainsi,</a:t>
                 </a:r>
-                <a:endParaRPr lang="fr-FR" dirty="0">
-                  <a:latin typeface="Segoe UI Semilight" panose="020B0402040204020203" pitchFamily="34" charset="0"/>
-                  <a:cs typeface="Segoe UI Semilight" panose="020B0402040204020203" pitchFamily="34" charset="0"/>
-                </a:endParaRPr>
-              </a:p>
-              <a:p>
                 <a:r>
                   <a:rPr lang="fr-FR" dirty="0">
                     <a:solidFill>
@@ -6207,7 +6214,7 @@
                     <a:latin typeface="Segoe UI Semilight" panose="020B0402040204020203" pitchFamily="34" charset="0"/>
                     <a:cs typeface="Segoe UI Semilight" panose="020B0402040204020203" pitchFamily="34" charset="0"/>
                   </a:rPr>
-                  <a:t>Ainsi, </a:t>
+                  <a:t> </a:t>
                 </a:r>
                 <a14:m>
                   <m:oMath xmlns:m="http://schemas.openxmlformats.org/officeDocument/2006/math">
@@ -6242,7 +6249,17 @@
                             <a:latin typeface="Cambria Math" panose="02040503050406030204" pitchFamily="18" charset="0"/>
                             <a:cs typeface="Segoe UI Semilight" panose="020B0402040204020203" pitchFamily="34" charset="0"/>
                           </a:rPr>
-                          <m:t>𝐴𝐵𝐶</m:t>
+                          <m:t>𝐴𝐵</m:t>
+                        </m:r>
+                        <m:r>
+                          <a:rPr lang="fr-FR" b="0" i="1" smtClean="0">
+                            <a:solidFill>
+                              <a:srgbClr val="FF0000"/>
+                            </a:solidFill>
+                            <a:latin typeface="Cambria Math" panose="02040503050406030204" pitchFamily="18" charset="0"/>
+                            <a:cs typeface="Segoe UI Semilight" panose="020B0402040204020203" pitchFamily="34" charset="0"/>
+                          </a:rPr>
+                          <m:t>𝐷</m:t>
                         </m:r>
                       </m:e>
                     </m:d>
@@ -6303,46 +6320,10 @@
                       </a:rPr>
                       <m:t> </m:t>
                     </m:r>
-                    <m:acc>
-                      <m:accPr>
-                        <m:chr m:val="⃗"/>
-                        <m:ctrlPr>
-                          <a:rPr lang="fr-FR" b="0" i="1" smtClean="0">
-                            <a:solidFill>
-                              <a:srgbClr val="FF0000"/>
-                            </a:solidFill>
-                            <a:latin typeface="Cambria Math" panose="02040503050406030204" pitchFamily="18" charset="0"/>
-                            <a:cs typeface="Segoe UI Semilight" panose="020B0402040204020203" pitchFamily="34" charset="0"/>
-                          </a:rPr>
-                        </m:ctrlPr>
-                      </m:accPr>
-                      <m:e>
-                        <m:r>
-                          <a:rPr lang="fr-FR" b="0" i="1" smtClean="0">
-                            <a:solidFill>
-                              <a:srgbClr val="FF0000"/>
-                            </a:solidFill>
-                            <a:latin typeface="Cambria Math" panose="02040503050406030204" pitchFamily="18" charset="0"/>
-                            <a:cs typeface="Segoe UI Semilight" panose="020B0402040204020203" pitchFamily="34" charset="0"/>
-                          </a:rPr>
-                          <m:t>𝐴𝐵</m:t>
-                        </m:r>
-                      </m:e>
-                    </m:acc>
-                    <m:r>
-                      <a:rPr lang="fr-FR" b="0" i="1" smtClean="0">
-                        <a:solidFill>
-                          <a:srgbClr val="FF0000"/>
-                        </a:solidFill>
-                        <a:latin typeface="Cambria Math" panose="02040503050406030204" pitchFamily="18" charset="0"/>
-                        <a:ea typeface="Cambria Math" panose="02040503050406030204" pitchFamily="18" charset="0"/>
-                        <a:cs typeface="Segoe UI Semilight" panose="020B0402040204020203" pitchFamily="34" charset="0"/>
-                      </a:rPr>
-                      <m:t>∧</m:t>
-                    </m:r>
-                    <m:acc>
-                      <m:accPr>
-                        <m:chr m:val="⃗"/>
+                    <m:d>
+                      <m:dPr>
+                        <m:begChr m:val="‖"/>
+                        <m:endChr m:val="‖"/>
                         <m:ctrlPr>
                           <a:rPr lang="fr-FR" b="0" i="1" smtClean="0">
                             <a:solidFill>
@@ -6353,10 +6334,36 @@
                             <a:cs typeface="Segoe UI Semilight" panose="020B0402040204020203" pitchFamily="34" charset="0"/>
                           </a:rPr>
                         </m:ctrlPr>
-                      </m:accPr>
+                      </m:dPr>
                       <m:e>
+                        <m:acc>
+                          <m:accPr>
+                            <m:chr m:val="⃗"/>
+                            <m:ctrlPr>
+                              <a:rPr lang="fr-FR" i="1">
+                                <a:solidFill>
+                                  <a:srgbClr val="FF0000"/>
+                                </a:solidFill>
+                                <a:latin typeface="Cambria Math" panose="02040503050406030204" pitchFamily="18" charset="0"/>
+                                <a:cs typeface="Segoe UI Semilight" panose="020B0402040204020203" pitchFamily="34" charset="0"/>
+                              </a:rPr>
+                            </m:ctrlPr>
+                          </m:accPr>
+                          <m:e>
+                            <m:r>
+                              <a:rPr lang="fr-FR" i="1">
+                                <a:solidFill>
+                                  <a:srgbClr val="FF0000"/>
+                                </a:solidFill>
+                                <a:latin typeface="Cambria Math" panose="02040503050406030204" pitchFamily="18" charset="0"/>
+                                <a:cs typeface="Segoe UI Semilight" panose="020B0402040204020203" pitchFamily="34" charset="0"/>
+                              </a:rPr>
+                              <m:t>𝐴𝐵</m:t>
+                            </m:r>
+                          </m:e>
+                        </m:acc>
                         <m:r>
-                          <a:rPr lang="fr-FR" b="0" i="1" smtClean="0">
+                          <a:rPr lang="fr-FR" i="1">
                             <a:solidFill>
                               <a:srgbClr val="FF0000"/>
                             </a:solidFill>
@@ -6364,10 +6371,49 @@
                             <a:ea typeface="Cambria Math" panose="02040503050406030204" pitchFamily="18" charset="0"/>
                             <a:cs typeface="Segoe UI Semilight" panose="020B0402040204020203" pitchFamily="34" charset="0"/>
                           </a:rPr>
-                          <m:t>𝐴𝐶</m:t>
+                          <m:t>∧</m:t>
                         </m:r>
+                        <m:acc>
+                          <m:accPr>
+                            <m:chr m:val="⃗"/>
+                            <m:ctrlPr>
+                              <a:rPr lang="fr-FR" i="1">
+                                <a:solidFill>
+                                  <a:srgbClr val="FF0000"/>
+                                </a:solidFill>
+                                <a:latin typeface="Cambria Math" panose="02040503050406030204" pitchFamily="18" charset="0"/>
+                                <a:ea typeface="Cambria Math" panose="02040503050406030204" pitchFamily="18" charset="0"/>
+                                <a:cs typeface="Segoe UI Semilight" panose="020B0402040204020203" pitchFamily="34" charset="0"/>
+                              </a:rPr>
+                            </m:ctrlPr>
+                          </m:accPr>
+                          <m:e>
+                            <m:r>
+                              <a:rPr lang="fr-FR" i="1">
+                                <a:solidFill>
+                                  <a:srgbClr val="FF0000"/>
+                                </a:solidFill>
+                                <a:latin typeface="Cambria Math" panose="02040503050406030204" pitchFamily="18" charset="0"/>
+                                <a:ea typeface="Cambria Math" panose="02040503050406030204" pitchFamily="18" charset="0"/>
+                                <a:cs typeface="Segoe UI Semilight" panose="020B0402040204020203" pitchFamily="34" charset="0"/>
+                              </a:rPr>
+                              <m:t>𝐴</m:t>
+                            </m:r>
+                            <m:r>
+                              <a:rPr lang="fr-FR" b="0" i="1" smtClean="0">
+                                <a:solidFill>
+                                  <a:srgbClr val="FF0000"/>
+                                </a:solidFill>
+                                <a:latin typeface="Cambria Math" panose="02040503050406030204" pitchFamily="18" charset="0"/>
+                                <a:ea typeface="Cambria Math" panose="02040503050406030204" pitchFamily="18" charset="0"/>
+                                <a:cs typeface="Segoe UI Semilight" panose="020B0402040204020203" pitchFamily="34" charset="0"/>
+                              </a:rPr>
+                              <m:t>𝐷</m:t>
+                            </m:r>
+                          </m:e>
+                        </m:acc>
                       </m:e>
-                    </m:acc>
+                    </m:d>
                   </m:oMath>
                 </a14:m>
                 <a:endParaRPr lang="fr-FR" dirty="0">
@@ -6399,7 +6445,7 @@
             <p:spPr>
               <a:xfrm>
                 <a:off x="4972050" y="2207275"/>
-                <a:ext cx="3810000" cy="1651991"/>
+                <a:ext cx="3810000" cy="1649169"/>
               </a:xfrm>
               <a:prstGeom prst="rect">
                 <a:avLst/>
@@ -6711,6 +6757,476 @@
           </a:p>
         </p:txBody>
       </p:sp>
+      <mc:AlternateContent xmlns:mc="http://schemas.openxmlformats.org/markup-compatibility/2006">
+        <mc:Choice xmlns:a14="http://schemas.microsoft.com/office/drawing/2010/main" Requires="a14">
+          <p:sp>
+            <p:nvSpPr>
+              <p:cNvPr id="8" name="ZoneTexte 7">
+                <a:extLst>
+                  <a:ext uri="{FF2B5EF4-FFF2-40B4-BE49-F238E27FC236}">
+                    <a16:creationId xmlns:a16="http://schemas.microsoft.com/office/drawing/2014/main" id="{373DB1EC-986F-4DB1-80D2-BB84F0D29861}"/>
+                  </a:ext>
+                </a:extLst>
+              </p:cNvPr>
+              <p:cNvSpPr txBox="1"/>
+              <p:nvPr/>
+            </p:nvSpPr>
+            <p:spPr>
+              <a:xfrm>
+                <a:off x="5238750" y="1936750"/>
+                <a:ext cx="3591024" cy="1222642"/>
+              </a:xfrm>
+              <a:prstGeom prst="rect">
+                <a:avLst/>
+              </a:prstGeom>
+              <a:noFill/>
+            </p:spPr>
+            <p:txBody>
+              <a:bodyPr wrap="square" rtlCol="0">
+                <a:spAutoFit/>
+              </a:bodyPr>
+              <a:lstStyle/>
+              <a:p>
+                <a14:m>
+                  <m:oMath xmlns:m="http://schemas.openxmlformats.org/officeDocument/2006/math">
+                    <m:r>
+                      <a:rPr lang="fr-FR" i="1" smtClean="0">
+                        <a:latin typeface="Cambria Math" panose="02040503050406030204" pitchFamily="18" charset="0"/>
+                        <a:cs typeface="Segoe UI" panose="020B0502040204020203" pitchFamily="34" charset="0"/>
+                      </a:rPr>
+                      <m:t>𝐴</m:t>
+                    </m:r>
+                    <m:r>
+                      <a:rPr lang="fr-FR" i="1" smtClean="0">
+                        <a:latin typeface="Cambria Math" panose="02040503050406030204" pitchFamily="18" charset="0"/>
+                        <a:cs typeface="Segoe UI" panose="020B0502040204020203" pitchFamily="34" charset="0"/>
+                      </a:rPr>
+                      <m:t>(</m:t>
+                    </m:r>
+                  </m:oMath>
+                </a14:m>
+                <a:r>
+                  <a:rPr lang="fr-FR" i="1" dirty="0">
+                    <a:latin typeface="Cambria Math" panose="02040503050406030204" pitchFamily="18" charset="0"/>
+                    <a:ea typeface="Cambria Math" panose="02040503050406030204" pitchFamily="18" charset="0"/>
+                    <a:cs typeface="Segoe UI" panose="020B0502040204020203" pitchFamily="34" charset="0"/>
+                  </a:rPr>
+                  <a:t>ABCD)</a:t>
+                </a:r>
+                <a:r>
+                  <a:rPr lang="fr-FR" b="1" i="1" dirty="0">
+                    <a:latin typeface="Segoe UI" panose="020B0502040204020203" pitchFamily="34" charset="0"/>
+                    <a:cs typeface="Segoe UI" panose="020B0502040204020203" pitchFamily="34" charset="0"/>
+                  </a:rPr>
+                  <a:t> </a:t>
+                </a:r>
+                <a:r>
+                  <a:rPr lang="fr-FR" b="1" dirty="0">
+                    <a:latin typeface="Segoe UI" panose="020B0502040204020203" pitchFamily="34" charset="0"/>
+                    <a:cs typeface="Segoe UI" panose="020B0502040204020203" pitchFamily="34" charset="0"/>
+                  </a:rPr>
+                  <a:t>= </a:t>
+                </a:r>
+                <a14:m>
+                  <m:oMath xmlns:m="http://schemas.openxmlformats.org/officeDocument/2006/math">
+                    <m:d>
+                      <m:dPr>
+                        <m:begChr m:val="‖"/>
+                        <m:endChr m:val="‖"/>
+                        <m:ctrlPr>
+                          <a:rPr lang="fr-FR" i="1">
+                            <a:latin typeface="Cambria Math" panose="02040503050406030204" pitchFamily="18" charset="0"/>
+                          </a:rPr>
+                        </m:ctrlPr>
+                      </m:dPr>
+                      <m:e>
+                        <m:acc>
+                          <m:accPr>
+                            <m:chr m:val="⃗"/>
+                            <m:ctrlPr>
+                              <a:rPr lang="fr-FR" i="1">
+                                <a:latin typeface="Cambria Math" panose="02040503050406030204" pitchFamily="18" charset="0"/>
+                              </a:rPr>
+                            </m:ctrlPr>
+                          </m:accPr>
+                          <m:e>
+                            <m:r>
+                              <a:rPr lang="fr-FR" i="1">
+                                <a:latin typeface="Cambria Math" panose="02040503050406030204" pitchFamily="18" charset="0"/>
+                              </a:rPr>
+                              <m:t>𝐴𝐵</m:t>
+                            </m:r>
+                          </m:e>
+                        </m:acc>
+                        <m:r>
+                          <a:rPr lang="fr-FR" i="1">
+                            <a:latin typeface="Cambria Math" panose="02040503050406030204" pitchFamily="18" charset="0"/>
+                          </a:rPr>
+                          <m:t> </m:t>
+                        </m:r>
+                        <m:r>
+                          <a:rPr lang="fr-FR" i="1">
+                            <a:latin typeface="Cambria Math" panose="02040503050406030204" pitchFamily="18" charset="0"/>
+                            <a:ea typeface="Cambria Math" panose="02040503050406030204" pitchFamily="18" charset="0"/>
+                          </a:rPr>
+                          <m:t>∧</m:t>
+                        </m:r>
+                        <m:acc>
+                          <m:accPr>
+                            <m:chr m:val="⃗"/>
+                            <m:ctrlPr>
+                              <a:rPr lang="fr-FR" i="1">
+                                <a:latin typeface="Cambria Math" panose="02040503050406030204" pitchFamily="18" charset="0"/>
+                                <a:ea typeface="Cambria Math" panose="02040503050406030204" pitchFamily="18" charset="0"/>
+                              </a:rPr>
+                            </m:ctrlPr>
+                          </m:accPr>
+                          <m:e>
+                            <m:r>
+                              <a:rPr lang="fr-FR" i="1">
+                                <a:latin typeface="Cambria Math" panose="02040503050406030204" pitchFamily="18" charset="0"/>
+                                <a:ea typeface="Cambria Math" panose="02040503050406030204" pitchFamily="18" charset="0"/>
+                              </a:rPr>
+                              <m:t>𝐴𝐷</m:t>
+                            </m:r>
+                          </m:e>
+                        </m:acc>
+                      </m:e>
+                    </m:d>
+                  </m:oMath>
+                </a14:m>
+                <a:endParaRPr lang="fr-FR" i="1" dirty="0">
+                  <a:latin typeface="Cambria Math" panose="02040503050406030204" pitchFamily="18" charset="0"/>
+                  <a:ea typeface="Cambria Math" panose="02040503050406030204" pitchFamily="18" charset="0"/>
+                </a:endParaRPr>
+              </a:p>
+              <a:p>
+                <a:pPr/>
+                <a:endParaRPr lang="fr-FR" i="1" dirty="0">
+                  <a:solidFill>
+                    <a:srgbClr val="FF0000"/>
+                  </a:solidFill>
+                  <a:latin typeface="Cambria Math" panose="02040503050406030204" pitchFamily="18" charset="0"/>
+                  <a:cs typeface="Segoe UI Semilight" panose="020B0402040204020203" pitchFamily="34" charset="0"/>
+                </a:endParaRPr>
+              </a:p>
+              <a:p>
+                <a:pPr/>
+                <a14:m>
+                  <m:oMathPara xmlns:m="http://schemas.openxmlformats.org/officeDocument/2006/math">
+                    <m:oMathParaPr>
+                      <m:jc m:val="left"/>
+                    </m:oMathParaPr>
+                    <m:oMath xmlns:m="http://schemas.openxmlformats.org/officeDocument/2006/math">
+                      <m:r>
+                        <a:rPr lang="fr-FR" i="1">
+                          <a:solidFill>
+                            <a:srgbClr val="FF0000"/>
+                          </a:solidFill>
+                          <a:latin typeface="Cambria Math" panose="02040503050406030204" pitchFamily="18" charset="0"/>
+                          <a:cs typeface="Segoe UI Semilight" panose="020B0402040204020203" pitchFamily="34" charset="0"/>
+                        </a:rPr>
+                        <m:t>𝐴</m:t>
+                      </m:r>
+                      <m:d>
+                        <m:dPr>
+                          <m:ctrlPr>
+                            <a:rPr lang="fr-FR" i="1">
+                              <a:solidFill>
+                                <a:srgbClr val="FF0000"/>
+                              </a:solidFill>
+                              <a:latin typeface="Cambria Math" panose="02040503050406030204" pitchFamily="18" charset="0"/>
+                              <a:cs typeface="Segoe UI Semilight" panose="020B0402040204020203" pitchFamily="34" charset="0"/>
+                            </a:rPr>
+                          </m:ctrlPr>
+                        </m:dPr>
+                        <m:e>
+                          <m:r>
+                            <a:rPr lang="fr-FR" i="1">
+                              <a:solidFill>
+                                <a:srgbClr val="FF0000"/>
+                              </a:solidFill>
+                              <a:latin typeface="Cambria Math" panose="02040503050406030204" pitchFamily="18" charset="0"/>
+                              <a:cs typeface="Segoe UI Semilight" panose="020B0402040204020203" pitchFamily="34" charset="0"/>
+                            </a:rPr>
+                            <m:t>𝐴𝐵</m:t>
+                          </m:r>
+                          <m:r>
+                            <a:rPr lang="fr-FR" b="0" i="1" smtClean="0">
+                              <a:solidFill>
+                                <a:srgbClr val="FF0000"/>
+                              </a:solidFill>
+                              <a:latin typeface="Cambria Math" panose="02040503050406030204" pitchFamily="18" charset="0"/>
+                              <a:cs typeface="Segoe UI Semilight" panose="020B0402040204020203" pitchFamily="34" charset="0"/>
+                            </a:rPr>
+                            <m:t>𝐷</m:t>
+                          </m:r>
+                        </m:e>
+                      </m:d>
+                      <m:r>
+                        <a:rPr lang="fr-FR" i="1">
+                          <a:solidFill>
+                            <a:srgbClr val="FF0000"/>
+                          </a:solidFill>
+                          <a:latin typeface="Cambria Math" panose="02040503050406030204" pitchFamily="18" charset="0"/>
+                          <a:cs typeface="Segoe UI Semilight" panose="020B0402040204020203" pitchFamily="34" charset="0"/>
+                        </a:rPr>
+                        <m:t>=</m:t>
+                      </m:r>
+                      <m:f>
+                        <m:fPr>
+                          <m:ctrlPr>
+                            <a:rPr lang="fr-FR" i="1">
+                              <a:solidFill>
+                                <a:srgbClr val="FF0000"/>
+                              </a:solidFill>
+                              <a:latin typeface="Cambria Math" panose="02040503050406030204" pitchFamily="18" charset="0"/>
+                              <a:cs typeface="Segoe UI Semilight" panose="020B0402040204020203" pitchFamily="34" charset="0"/>
+                            </a:rPr>
+                          </m:ctrlPr>
+                        </m:fPr>
+                        <m:num>
+                          <m:r>
+                            <a:rPr lang="fr-FR" i="1">
+                              <a:solidFill>
+                                <a:srgbClr val="FF0000"/>
+                              </a:solidFill>
+                              <a:latin typeface="Cambria Math" panose="02040503050406030204" pitchFamily="18" charset="0"/>
+                              <a:cs typeface="Segoe UI Semilight" panose="020B0402040204020203" pitchFamily="34" charset="0"/>
+                            </a:rPr>
+                            <m:t>1</m:t>
+                          </m:r>
+                        </m:num>
+                        <m:den>
+                          <m:r>
+                            <a:rPr lang="fr-FR" i="1">
+                              <a:solidFill>
+                                <a:srgbClr val="FF0000"/>
+                              </a:solidFill>
+                              <a:latin typeface="Cambria Math" panose="02040503050406030204" pitchFamily="18" charset="0"/>
+                              <a:cs typeface="Segoe UI Semilight" panose="020B0402040204020203" pitchFamily="34" charset="0"/>
+                            </a:rPr>
+                            <m:t>2</m:t>
+                          </m:r>
+                        </m:den>
+                      </m:f>
+                      <m:r>
+                        <a:rPr lang="fr-FR" i="1">
+                          <a:solidFill>
+                            <a:srgbClr val="FF0000"/>
+                          </a:solidFill>
+                          <a:latin typeface="Cambria Math" panose="02040503050406030204" pitchFamily="18" charset="0"/>
+                          <a:cs typeface="Segoe UI Semilight" panose="020B0402040204020203" pitchFamily="34" charset="0"/>
+                        </a:rPr>
+                        <m:t> </m:t>
+                      </m:r>
+                      <m:d>
+                        <m:dPr>
+                          <m:begChr m:val="‖"/>
+                          <m:endChr m:val="‖"/>
+                          <m:ctrlPr>
+                            <a:rPr lang="fr-FR" i="1">
+                              <a:solidFill>
+                                <a:srgbClr val="FF0000"/>
+                              </a:solidFill>
+                              <a:latin typeface="Cambria Math" panose="02040503050406030204" pitchFamily="18" charset="0"/>
+                              <a:ea typeface="Cambria Math" panose="02040503050406030204" pitchFamily="18" charset="0"/>
+                              <a:cs typeface="Segoe UI Semilight" panose="020B0402040204020203" pitchFamily="34" charset="0"/>
+                            </a:rPr>
+                          </m:ctrlPr>
+                        </m:dPr>
+                        <m:e>
+                          <m:acc>
+                            <m:accPr>
+                              <m:chr m:val="⃗"/>
+                              <m:ctrlPr>
+                                <a:rPr lang="fr-FR" i="1">
+                                  <a:solidFill>
+                                    <a:srgbClr val="FF0000"/>
+                                  </a:solidFill>
+                                  <a:latin typeface="Cambria Math" panose="02040503050406030204" pitchFamily="18" charset="0"/>
+                                  <a:cs typeface="Segoe UI Semilight" panose="020B0402040204020203" pitchFamily="34" charset="0"/>
+                                </a:rPr>
+                              </m:ctrlPr>
+                            </m:accPr>
+                            <m:e>
+                              <m:r>
+                                <a:rPr lang="fr-FR" i="1">
+                                  <a:solidFill>
+                                    <a:srgbClr val="FF0000"/>
+                                  </a:solidFill>
+                                  <a:latin typeface="Cambria Math" panose="02040503050406030204" pitchFamily="18" charset="0"/>
+                                  <a:cs typeface="Segoe UI Semilight" panose="020B0402040204020203" pitchFamily="34" charset="0"/>
+                                </a:rPr>
+                                <m:t>𝐴𝐵</m:t>
+                              </m:r>
+                            </m:e>
+                          </m:acc>
+                          <m:r>
+                            <a:rPr lang="fr-FR" i="1">
+                              <a:solidFill>
+                                <a:srgbClr val="FF0000"/>
+                              </a:solidFill>
+                              <a:latin typeface="Cambria Math" panose="02040503050406030204" pitchFamily="18" charset="0"/>
+                              <a:ea typeface="Cambria Math" panose="02040503050406030204" pitchFamily="18" charset="0"/>
+                              <a:cs typeface="Segoe UI Semilight" panose="020B0402040204020203" pitchFamily="34" charset="0"/>
+                            </a:rPr>
+                            <m:t>∧</m:t>
+                          </m:r>
+                          <m:acc>
+                            <m:accPr>
+                              <m:chr m:val="⃗"/>
+                              <m:ctrlPr>
+                                <a:rPr lang="fr-FR" i="1">
+                                  <a:solidFill>
+                                    <a:srgbClr val="FF0000"/>
+                                  </a:solidFill>
+                                  <a:latin typeface="Cambria Math" panose="02040503050406030204" pitchFamily="18" charset="0"/>
+                                  <a:ea typeface="Cambria Math" panose="02040503050406030204" pitchFamily="18" charset="0"/>
+                                  <a:cs typeface="Segoe UI Semilight" panose="020B0402040204020203" pitchFamily="34" charset="0"/>
+                                </a:rPr>
+                              </m:ctrlPr>
+                            </m:accPr>
+                            <m:e>
+                              <m:r>
+                                <a:rPr lang="fr-FR" i="1">
+                                  <a:solidFill>
+                                    <a:srgbClr val="FF0000"/>
+                                  </a:solidFill>
+                                  <a:latin typeface="Cambria Math" panose="02040503050406030204" pitchFamily="18" charset="0"/>
+                                  <a:ea typeface="Cambria Math" panose="02040503050406030204" pitchFamily="18" charset="0"/>
+                                  <a:cs typeface="Segoe UI Semilight" panose="020B0402040204020203" pitchFamily="34" charset="0"/>
+                                </a:rPr>
+                                <m:t>𝐴</m:t>
+                              </m:r>
+                              <m:r>
+                                <a:rPr lang="fr-FR" b="0" i="1" smtClean="0">
+                                  <a:solidFill>
+                                    <a:srgbClr val="FF0000"/>
+                                  </a:solidFill>
+                                  <a:latin typeface="Cambria Math" panose="02040503050406030204" pitchFamily="18" charset="0"/>
+                                  <a:ea typeface="Cambria Math" panose="02040503050406030204" pitchFamily="18" charset="0"/>
+                                  <a:cs typeface="Segoe UI Semilight" panose="020B0402040204020203" pitchFamily="34" charset="0"/>
+                                </a:rPr>
+                                <m:t>𝐷</m:t>
+                              </m:r>
+                            </m:e>
+                          </m:acc>
+                        </m:e>
+                      </m:d>
+                    </m:oMath>
+                  </m:oMathPara>
+                </a14:m>
+                <a:endParaRPr lang="fr-FR" dirty="0"/>
+              </a:p>
+            </p:txBody>
+          </p:sp>
+        </mc:Choice>
+        <mc:Fallback>
+          <p:sp>
+            <p:nvSpPr>
+              <p:cNvPr id="8" name="ZoneTexte 7">
+                <a:extLst>
+                  <a:ext uri="{FF2B5EF4-FFF2-40B4-BE49-F238E27FC236}">
+                    <a16:creationId xmlns:a16="http://schemas.microsoft.com/office/drawing/2014/main" id="{373DB1EC-986F-4DB1-80D2-BB84F0D29861}"/>
+                  </a:ext>
+                </a:extLst>
+              </p:cNvPr>
+              <p:cNvSpPr txBox="1">
+                <a:spLocks noRot="1" noChangeAspect="1" noMove="1" noResize="1" noEditPoints="1" noAdjustHandles="1" noChangeArrowheads="1" noChangeShapeType="1" noTextEdit="1"/>
+              </p:cNvSpPr>
+              <p:nvPr/>
+            </p:nvSpPr>
+            <p:spPr>
+              <a:xfrm>
+                <a:off x="5238750" y="1936750"/>
+                <a:ext cx="3591024" cy="1222642"/>
+              </a:xfrm>
+              <a:prstGeom prst="rect">
+                <a:avLst/>
+              </a:prstGeom>
+              <a:blipFill>
+                <a:blip r:embed="rId2"/>
+                <a:stretch>
+                  <a:fillRect t="-500"/>
+                </a:stretch>
+              </a:blipFill>
+            </p:spPr>
+            <p:txBody>
+              <a:bodyPr/>
+              <a:lstStyle/>
+              <a:p>
+                <a:r>
+                  <a:rPr lang="fr-FR">
+                    <a:noFill/>
+                  </a:rPr>
+                  <a:t> </a:t>
+                </a:r>
+              </a:p>
+            </p:txBody>
+          </p:sp>
+        </mc:Fallback>
+      </mc:AlternateContent>
+      <p:pic>
+        <p:nvPicPr>
+          <p:cNvPr id="10" name="Image 9">
+            <a:extLst>
+              <a:ext uri="{FF2B5EF4-FFF2-40B4-BE49-F238E27FC236}">
+                <a16:creationId xmlns:a16="http://schemas.microsoft.com/office/drawing/2014/main" id="{B55FC0C7-A812-4E99-9852-4B89568BA064}"/>
+              </a:ext>
+            </a:extLst>
+          </p:cNvPr>
+          <p:cNvPicPr>
+            <a:picLocks noChangeAspect="1"/>
+          </p:cNvPicPr>
+          <p:nvPr/>
+        </p:nvPicPr>
+        <p:blipFill>
+          <a:blip r:embed="rId3"/>
+          <a:stretch>
+            <a:fillRect/>
+          </a:stretch>
+        </p:blipFill>
+        <p:spPr>
+          <a:xfrm>
+            <a:off x="280647" y="1735172"/>
+            <a:ext cx="4959365" cy="2848439"/>
+          </a:xfrm>
+          <a:prstGeom prst="rect">
+            <a:avLst/>
+          </a:prstGeom>
+        </p:spPr>
+      </p:pic>
+      <p:pic>
+        <p:nvPicPr>
+          <p:cNvPr id="12" name="Image 11">
+            <a:extLst>
+              <a:ext uri="{FF2B5EF4-FFF2-40B4-BE49-F238E27FC236}">
+                <a16:creationId xmlns:a16="http://schemas.microsoft.com/office/drawing/2014/main" id="{502C9213-10EF-48C7-9CE8-A9C1C96E70BE}"/>
+              </a:ext>
+            </a:extLst>
+          </p:cNvPr>
+          <p:cNvPicPr>
+            <a:picLocks noChangeAspect="1"/>
+          </p:cNvPicPr>
+          <p:nvPr/>
+        </p:nvPicPr>
+        <p:blipFill>
+          <a:blip r:embed="rId4"/>
+          <a:stretch>
+            <a:fillRect/>
+          </a:stretch>
+        </p:blipFill>
+        <p:spPr>
+          <a:xfrm>
+            <a:off x="6211229" y="3360970"/>
+            <a:ext cx="2238917" cy="1492611"/>
+          </a:xfrm>
+          <a:prstGeom prst="rect">
+            <a:avLst/>
+          </a:prstGeom>
+        </p:spPr>
+      </p:pic>
     </p:spTree>
     <p:extLst>
       <p:ext uri="{BB962C8B-B14F-4D97-AF65-F5344CB8AC3E}">
@@ -6787,19 +7303,24 @@
           <a:p>
             <a:r>
               <a:rPr lang="fr-FR" dirty="0"/>
-              <a:t>Définition des points</a:t>
-            </a:r>
-          </a:p>
-        </p:txBody>
-      </p:sp>
-      <p:sp>
-        <p:nvSpPr>
-          <p:cNvPr id="4" name="Espace réservé du texte 3"/>
-          <p:cNvSpPr>
-            <a:spLocks noGrp="1"/>
-          </p:cNvSpPr>
-          <p:nvPr>
-            <p:ph type="body" sz="quarter" idx="3"/>
+              <a:t>Modèle </a:t>
+            </a:r>
+            <a:r>
+              <a:rPr lang="fr-FR" dirty="0" err="1"/>
+              <a:t>Geogebra</a:t>
+            </a:r>
+            <a:endParaRPr lang="fr-FR" dirty="0"/>
+          </a:p>
+        </p:txBody>
+      </p:sp>
+      <p:sp>
+        <p:nvSpPr>
+          <p:cNvPr id="5" name="Espace réservé du texte 4"/>
+          <p:cNvSpPr>
+            <a:spLocks noGrp="1"/>
+          </p:cNvSpPr>
+          <p:nvPr>
+            <p:ph type="body" sz="quarter" idx="14"/>
           </p:nvPr>
         </p:nvSpPr>
         <p:spPr/>
@@ -6807,55 +7328,12 @@
           <a:bodyPr/>
           <a:lstStyle/>
           <a:p>
-            <a:endParaRPr lang="fr-FR"/>
-          </a:p>
-        </p:txBody>
-      </p:sp>
-      <p:sp>
-        <p:nvSpPr>
-          <p:cNvPr id="5" name="Espace réservé du texte 4"/>
-          <p:cNvSpPr>
-            <a:spLocks noGrp="1"/>
-          </p:cNvSpPr>
-          <p:nvPr>
-            <p:ph type="body" sz="quarter" idx="14"/>
-          </p:nvPr>
-        </p:nvSpPr>
-        <p:spPr/>
-        <p:txBody>
-          <a:bodyPr/>
-          <a:lstStyle/>
-          <a:p>
             <a:r>
               <a:rPr lang="fr-FR" dirty="0"/>
               <a:t>Collision cercle - triangle</a:t>
             </a:r>
           </a:p>
         </p:txBody>
-      </p:sp>
-      <p:sp>
-        <p:nvSpPr>
-          <p:cNvPr id="6" name="Espace réservé du graphique 5"/>
-          <p:cNvSpPr>
-            <a:spLocks noGrp="1"/>
-          </p:cNvSpPr>
-          <p:nvPr>
-            <p:ph type="chart" sz="quarter" idx="15"/>
-          </p:nvPr>
-        </p:nvSpPr>
-        <p:spPr/>
-      </p:sp>
-      <p:sp>
-        <p:nvSpPr>
-          <p:cNvPr id="7" name="Espace réservé du graphique 6"/>
-          <p:cNvSpPr>
-            <a:spLocks noGrp="1"/>
-          </p:cNvSpPr>
-          <p:nvPr>
-            <p:ph type="chart" sz="quarter" idx="16"/>
-          </p:nvPr>
-        </p:nvSpPr>
-        <p:spPr/>
       </p:sp>
     </p:spTree>
     <p:extLst>

</xml_diff>

<commit_message>
Powerpoint + couleur crédits
</commit_message>
<xml_diff>
--- a/Présentation projet/Projet ISN.pptx
+++ b/Présentation projet/Projet ISN.pptx
@@ -5,10 +5,10 @@
     <p:sldMasterId id="2147483648" r:id="rId2"/>
   </p:sldMasterIdLst>
   <p:notesMasterIdLst>
-    <p:notesMasterId r:id="rId19"/>
+    <p:notesMasterId r:id="rId20"/>
   </p:notesMasterIdLst>
   <p:handoutMasterIdLst>
-    <p:handoutMasterId r:id="rId20"/>
+    <p:handoutMasterId r:id="rId21"/>
   </p:handoutMasterIdLst>
   <p:sldIdLst>
     <p:sldId id="256" r:id="rId3"/>
@@ -24,9 +24,10 @@
     <p:sldId id="270" r:id="rId13"/>
     <p:sldId id="271" r:id="rId14"/>
     <p:sldId id="272" r:id="rId15"/>
-    <p:sldId id="273" r:id="rId16"/>
-    <p:sldId id="274" r:id="rId17"/>
-    <p:sldId id="275" r:id="rId18"/>
+    <p:sldId id="276" r:id="rId16"/>
+    <p:sldId id="273" r:id="rId17"/>
+    <p:sldId id="274" r:id="rId18"/>
+    <p:sldId id="275" r:id="rId19"/>
   </p:sldIdLst>
   <p:sldSz cx="9144000" cy="5143500" type="screen16x9"/>
   <p:notesSz cx="6858000" cy="9144000"/>
@@ -143,6 +144,7 @@
             <p14:sldId id="270"/>
             <p14:sldId id="271"/>
             <p14:sldId id="272"/>
+            <p14:sldId id="276"/>
             <p14:sldId id="273"/>
             <p14:sldId id="274"/>
             <p14:sldId id="275"/>
@@ -730,7 +732,10 @@
           <a:bodyPr/>
           <a:lstStyle/>
           <a:p>
-            <a:endParaRPr lang="fr-FR" dirty="0"/>
+            <a:r>
+              <a:rPr lang="fr-FR" dirty="0"/>
+              <a:t>Clément V.</a:t>
+            </a:r>
           </a:p>
         </p:txBody>
       </p:sp>
@@ -761,6 +766,267 @@
     <p:extLst>
       <p:ext uri="{BB962C8B-B14F-4D97-AF65-F5344CB8AC3E}">
         <p14:creationId xmlns:p14="http://schemas.microsoft.com/office/powerpoint/2010/main" val="2039035942"/>
+      </p:ext>
+    </p:extLst>
+  </p:cSld>
+  <p:clrMapOvr>
+    <a:masterClrMapping/>
+  </p:clrMapOvr>
+</p:notes>
+</file>
+
+<file path=ppt/notesSlides/notesSlide2.xml><?xml version="1.0" encoding="utf-8"?>
+<p:notes xmlns:a="http://schemas.openxmlformats.org/drawingml/2006/main" xmlns:r="http://schemas.openxmlformats.org/officeDocument/2006/relationships" xmlns:p="http://schemas.openxmlformats.org/presentationml/2006/main">
+  <p:cSld>
+    <p:spTree>
+      <p:nvGrpSpPr>
+        <p:cNvPr id="1" name=""/>
+        <p:cNvGrpSpPr/>
+        <p:nvPr/>
+      </p:nvGrpSpPr>
+      <p:grpSpPr>
+        <a:xfrm>
+          <a:off x="0" y="0"/>
+          <a:ext cx="0" cy="0"/>
+          <a:chOff x="0" y="0"/>
+          <a:chExt cx="0" cy="0"/>
+        </a:xfrm>
+      </p:grpSpPr>
+      <p:sp>
+        <p:nvSpPr>
+          <p:cNvPr id="2" name="Espace réservé de l'image des diapositives 1"/>
+          <p:cNvSpPr>
+            <a:spLocks noGrp="1" noRot="1" noChangeAspect="1"/>
+          </p:cNvSpPr>
+          <p:nvPr>
+            <p:ph type="sldImg"/>
+          </p:nvPr>
+        </p:nvSpPr>
+        <p:spPr/>
+      </p:sp>
+      <p:sp>
+        <p:nvSpPr>
+          <p:cNvPr id="3" name="Espace réservé des notes 2"/>
+          <p:cNvSpPr>
+            <a:spLocks noGrp="1"/>
+          </p:cNvSpPr>
+          <p:nvPr>
+            <p:ph type="body" idx="1"/>
+          </p:nvPr>
+        </p:nvSpPr>
+        <p:spPr/>
+        <p:txBody>
+          <a:bodyPr/>
+          <a:lstStyle/>
+          <a:p>
+            <a:r>
+              <a:rPr lang="fr-FR" dirty="0"/>
+              <a:t>Clément G. / Clément V.</a:t>
+            </a:r>
+          </a:p>
+        </p:txBody>
+      </p:sp>
+      <p:sp>
+        <p:nvSpPr>
+          <p:cNvPr id="4" name="Espace réservé du numéro de diapositive 3"/>
+          <p:cNvSpPr>
+            <a:spLocks noGrp="1"/>
+          </p:cNvSpPr>
+          <p:nvPr>
+            <p:ph type="sldNum" sz="quarter" idx="10"/>
+          </p:nvPr>
+        </p:nvSpPr>
+        <p:spPr/>
+        <p:txBody>
+          <a:bodyPr/>
+          <a:lstStyle/>
+          <a:p>
+            <a:fld id="{66641530-902D-4C06-9450-78EBD7B0878A}" type="slidenum">
+              <a:rPr lang="fr-FR" smtClean="0"/>
+              <a:t>2</a:t>
+            </a:fld>
+            <a:endParaRPr lang="fr-FR"/>
+          </a:p>
+        </p:txBody>
+      </p:sp>
+    </p:spTree>
+    <p:extLst>
+      <p:ext uri="{BB962C8B-B14F-4D97-AF65-F5344CB8AC3E}">
+        <p14:creationId xmlns:p14="http://schemas.microsoft.com/office/powerpoint/2010/main" val="453538282"/>
+      </p:ext>
+    </p:extLst>
+  </p:cSld>
+  <p:clrMapOvr>
+    <a:masterClrMapping/>
+  </p:clrMapOvr>
+</p:notes>
+</file>
+
+<file path=ppt/notesSlides/notesSlide3.xml><?xml version="1.0" encoding="utf-8"?>
+<p:notes xmlns:a="http://schemas.openxmlformats.org/drawingml/2006/main" xmlns:r="http://schemas.openxmlformats.org/officeDocument/2006/relationships" xmlns:p="http://schemas.openxmlformats.org/presentationml/2006/main">
+  <p:cSld>
+    <p:spTree>
+      <p:nvGrpSpPr>
+        <p:cNvPr id="1" name=""/>
+        <p:cNvGrpSpPr/>
+        <p:nvPr/>
+      </p:nvGrpSpPr>
+      <p:grpSpPr>
+        <a:xfrm>
+          <a:off x="0" y="0"/>
+          <a:ext cx="0" cy="0"/>
+          <a:chOff x="0" y="0"/>
+          <a:chExt cx="0" cy="0"/>
+        </a:xfrm>
+      </p:grpSpPr>
+      <p:sp>
+        <p:nvSpPr>
+          <p:cNvPr id="2" name="Espace réservé de l'image des diapositives 1"/>
+          <p:cNvSpPr>
+            <a:spLocks noGrp="1" noRot="1" noChangeAspect="1"/>
+          </p:cNvSpPr>
+          <p:nvPr>
+            <p:ph type="sldImg"/>
+          </p:nvPr>
+        </p:nvSpPr>
+        <p:spPr/>
+      </p:sp>
+      <p:sp>
+        <p:nvSpPr>
+          <p:cNvPr id="3" name="Espace réservé des notes 2"/>
+          <p:cNvSpPr>
+            <a:spLocks noGrp="1"/>
+          </p:cNvSpPr>
+          <p:nvPr>
+            <p:ph type="body" idx="1"/>
+          </p:nvPr>
+        </p:nvSpPr>
+        <p:spPr/>
+        <p:txBody>
+          <a:bodyPr/>
+          <a:lstStyle/>
+          <a:p>
+            <a:r>
+              <a:rPr lang="fr-FR" dirty="0"/>
+              <a:t>Vincent</a:t>
+            </a:r>
+          </a:p>
+        </p:txBody>
+      </p:sp>
+      <p:sp>
+        <p:nvSpPr>
+          <p:cNvPr id="4" name="Espace réservé du numéro de diapositive 3"/>
+          <p:cNvSpPr>
+            <a:spLocks noGrp="1"/>
+          </p:cNvSpPr>
+          <p:nvPr>
+            <p:ph type="sldNum" sz="quarter" idx="10"/>
+          </p:nvPr>
+        </p:nvSpPr>
+        <p:spPr/>
+        <p:txBody>
+          <a:bodyPr/>
+          <a:lstStyle/>
+          <a:p>
+            <a:fld id="{66641530-902D-4C06-9450-78EBD7B0878A}" type="slidenum">
+              <a:rPr lang="fr-FR" smtClean="0"/>
+              <a:t>3</a:t>
+            </a:fld>
+            <a:endParaRPr lang="fr-FR"/>
+          </a:p>
+        </p:txBody>
+      </p:sp>
+    </p:spTree>
+    <p:extLst>
+      <p:ext uri="{BB962C8B-B14F-4D97-AF65-F5344CB8AC3E}">
+        <p14:creationId xmlns:p14="http://schemas.microsoft.com/office/powerpoint/2010/main" val="1498374207"/>
+      </p:ext>
+    </p:extLst>
+  </p:cSld>
+  <p:clrMapOvr>
+    <a:masterClrMapping/>
+  </p:clrMapOvr>
+</p:notes>
+</file>
+
+<file path=ppt/notesSlides/notesSlide4.xml><?xml version="1.0" encoding="utf-8"?>
+<p:notes xmlns:a="http://schemas.openxmlformats.org/drawingml/2006/main" xmlns:r="http://schemas.openxmlformats.org/officeDocument/2006/relationships" xmlns:p="http://schemas.openxmlformats.org/presentationml/2006/main">
+  <p:cSld>
+    <p:spTree>
+      <p:nvGrpSpPr>
+        <p:cNvPr id="1" name=""/>
+        <p:cNvGrpSpPr/>
+        <p:nvPr/>
+      </p:nvGrpSpPr>
+      <p:grpSpPr>
+        <a:xfrm>
+          <a:off x="0" y="0"/>
+          <a:ext cx="0" cy="0"/>
+          <a:chOff x="0" y="0"/>
+          <a:chExt cx="0" cy="0"/>
+        </a:xfrm>
+      </p:grpSpPr>
+      <p:sp>
+        <p:nvSpPr>
+          <p:cNvPr id="2" name="Espace réservé de l'image des diapositives 1"/>
+          <p:cNvSpPr>
+            <a:spLocks noGrp="1" noRot="1" noChangeAspect="1"/>
+          </p:cNvSpPr>
+          <p:nvPr>
+            <p:ph type="sldImg"/>
+          </p:nvPr>
+        </p:nvSpPr>
+        <p:spPr/>
+      </p:sp>
+      <p:sp>
+        <p:nvSpPr>
+          <p:cNvPr id="3" name="Espace réservé des notes 2"/>
+          <p:cNvSpPr>
+            <a:spLocks noGrp="1"/>
+          </p:cNvSpPr>
+          <p:nvPr>
+            <p:ph type="body" idx="1"/>
+          </p:nvPr>
+        </p:nvSpPr>
+        <p:spPr/>
+        <p:txBody>
+          <a:bodyPr/>
+          <a:lstStyle/>
+          <a:p>
+            <a:r>
+              <a:rPr lang="fr-FR" dirty="0"/>
+              <a:t>Vincent. Collision simplifié</a:t>
+            </a:r>
+          </a:p>
+        </p:txBody>
+      </p:sp>
+      <p:sp>
+        <p:nvSpPr>
+          <p:cNvPr id="4" name="Espace réservé du numéro de diapositive 3"/>
+          <p:cNvSpPr>
+            <a:spLocks noGrp="1"/>
+          </p:cNvSpPr>
+          <p:nvPr>
+            <p:ph type="sldNum" sz="quarter" idx="10"/>
+          </p:nvPr>
+        </p:nvSpPr>
+        <p:spPr/>
+        <p:txBody>
+          <a:bodyPr/>
+          <a:lstStyle/>
+          <a:p>
+            <a:fld id="{66641530-902D-4C06-9450-78EBD7B0878A}" type="slidenum">
+              <a:rPr lang="fr-FR" smtClean="0"/>
+              <a:t>4</a:t>
+            </a:fld>
+            <a:endParaRPr lang="fr-FR"/>
+          </a:p>
+        </p:txBody>
+      </p:sp>
+    </p:spTree>
+    <p:extLst>
+      <p:ext uri="{BB962C8B-B14F-4D97-AF65-F5344CB8AC3E}">
+        <p14:creationId xmlns:p14="http://schemas.microsoft.com/office/powerpoint/2010/main" val="3954143336"/>
       </p:ext>
     </p:extLst>
   </p:cSld>
@@ -4454,7 +4720,7 @@
           <a:lstStyle/>
           <a:p>
             <a:r>
-              <a:rPr lang="fr-FR" dirty="0"/>
+              <a:rPr lang="fr-FR" u="sng" dirty="0"/>
               <a:t>Projet ISN : Un premier jeu</a:t>
             </a:r>
           </a:p>
@@ -4476,23 +4742,23 @@
           <a:lstStyle/>
           <a:p>
             <a:r>
-              <a:rPr lang="fr-FR" dirty="0"/>
+              <a:rPr lang="fr-FR" u="sng" dirty="0"/>
               <a:t>Revisite du mythique « </a:t>
             </a:r>
             <a:r>
-              <a:rPr lang="fr-FR" dirty="0" err="1"/>
+              <a:rPr lang="fr-FR" u="sng" dirty="0" err="1"/>
               <a:t>Space</a:t>
             </a:r>
             <a:r>
-              <a:rPr lang="fr-FR" dirty="0"/>
+              <a:rPr lang="fr-FR" u="sng" dirty="0"/>
               <a:t> </a:t>
             </a:r>
             <a:r>
-              <a:rPr lang="fr-FR" dirty="0" err="1"/>
+              <a:rPr lang="fr-FR" u="sng" dirty="0" err="1"/>
               <a:t>Invaders</a:t>
             </a:r>
             <a:r>
-              <a:rPr lang="fr-FR" dirty="0"/>
+              <a:rPr lang="fr-FR" u="sng" dirty="0"/>
               <a:t> »</a:t>
             </a:r>
           </a:p>
@@ -4526,6 +4792,7 @@
           <a:prstGeom prst="rect">
             <a:avLst/>
           </a:prstGeom>
+          <a:noFill/>
         </p:spPr>
       </p:pic>
       <p:sp>
@@ -4561,7 +4828,7 @@
                 <a:latin typeface="Segoe UI Semilight" panose="020B0402040204020203" pitchFamily="34" charset="0"/>
                 <a:cs typeface="Segoe UI Semilight" panose="020B0402040204020203" pitchFamily="34" charset="0"/>
               </a:rPr>
-              <a:t>Fig. 1 : Ecran d’accueil</a:t>
+              <a:t>Ecran d’accueil</a:t>
             </a:r>
           </a:p>
         </p:txBody>
@@ -5470,10 +5737,10 @@
       </p:grpSpPr>
       <p:sp>
         <p:nvSpPr>
-          <p:cNvPr id="2" name="Espace réservé du texte 1">
+          <p:cNvPr id="2" name="Titre 1">
             <a:extLst>
               <a:ext uri="{FF2B5EF4-FFF2-40B4-BE49-F238E27FC236}">
-                <a16:creationId xmlns:a16="http://schemas.microsoft.com/office/drawing/2014/main" id="{592FF3E2-BEA2-48EF-904E-BA12E0A1A7DE}"/>
+                <a16:creationId xmlns:a16="http://schemas.microsoft.com/office/drawing/2014/main" id="{B588647B-03D1-4728-A2B8-02DAB37AD1BD}"/>
               </a:ext>
             </a:extLst>
           </p:cNvPr>
@@ -5481,34 +5748,56 @@
             <a:spLocks noGrp="1"/>
           </p:cNvSpPr>
           <p:nvPr>
-            <p:ph type="body" sz="quarter" idx="13"/>
-          </p:nvPr>
-        </p:nvSpPr>
-        <p:spPr>
-          <a:xfrm>
-            <a:off x="317421" y="358311"/>
-            <a:ext cx="3714829" cy="272821"/>
-          </a:xfrm>
-        </p:spPr>
-        <p:txBody>
-          <a:bodyPr>
-            <a:normAutofit/>
-          </a:bodyPr>
+            <p:ph type="title"/>
+          </p:nvPr>
+        </p:nvSpPr>
+        <p:spPr/>
+        <p:txBody>
+          <a:bodyPr/>
           <a:lstStyle/>
           <a:p>
             <a:r>
               <a:rPr lang="fr-FR" dirty="0"/>
-              <a:t>Menu des options et barres de réglage</a:t>
-            </a:r>
-          </a:p>
-        </p:txBody>
-      </p:sp>
-      <p:sp>
-        <p:nvSpPr>
-          <p:cNvPr id="3" name="Espace réservé du texte 2">
+              <a:t>Menus</a:t>
+            </a:r>
+          </a:p>
+        </p:txBody>
+      </p:sp>
+      <p:pic>
+        <p:nvPicPr>
+          <p:cNvPr id="6" name="Espace réservé du contenu 5">
             <a:extLst>
               <a:ext uri="{FF2B5EF4-FFF2-40B4-BE49-F238E27FC236}">
-                <a16:creationId xmlns:a16="http://schemas.microsoft.com/office/drawing/2014/main" id="{87BC9DCC-E82B-49D5-9980-2FF7CDC00578}"/>
+                <a16:creationId xmlns:a16="http://schemas.microsoft.com/office/drawing/2014/main" id="{59E57518-0809-4053-8E5E-3C23F282236A}"/>
+              </a:ext>
+            </a:extLst>
+          </p:cNvPr>
+          <p:cNvPicPr>
+            <a:picLocks noGrp="1" noChangeAspect="1"/>
+          </p:cNvPicPr>
+          <p:nvPr>
+            <p:ph idx="1"/>
+          </p:nvPr>
+        </p:nvPicPr>
+        <p:blipFill>
+          <a:blip r:embed="rId2"/>
+          <a:stretch>
+            <a:fillRect/>
+          </a:stretch>
+        </p:blipFill>
+        <p:spPr>
+          <a:xfrm>
+            <a:off x="179310" y="857667"/>
+            <a:ext cx="1352739" cy="181000"/>
+          </a:xfrm>
+        </p:spPr>
+      </p:pic>
+      <p:sp>
+        <p:nvSpPr>
+          <p:cNvPr id="4" name="Espace réservé du texte 3">
+            <a:extLst>
+              <a:ext uri="{FF2B5EF4-FFF2-40B4-BE49-F238E27FC236}">
+                <a16:creationId xmlns:a16="http://schemas.microsoft.com/office/drawing/2014/main" id="{2FD3F4CB-A094-4D9A-8A51-3EDC6D1BDEDA}"/>
               </a:ext>
             </a:extLst>
           </p:cNvPr>
@@ -5516,7 +5805,7 @@
             <a:spLocks noGrp="1"/>
           </p:cNvSpPr>
           <p:nvPr>
-            <p:ph type="body" sz="quarter" idx="14"/>
+            <p:ph type="body" sz="quarter" idx="13"/>
           </p:nvPr>
         </p:nvSpPr>
         <p:spPr/>
@@ -5526,17 +5815,17 @@
           <a:p>
             <a:r>
               <a:rPr lang="fr-FR" dirty="0"/>
-              <a:t>Menus</a:t>
+              <a:t>Barres de réglages</a:t>
             </a:r>
           </a:p>
         </p:txBody>
       </p:sp>
       <p:pic>
         <p:nvPicPr>
-          <p:cNvPr id="5" name="Image 4">
+          <p:cNvPr id="8" name="Image 7">
             <a:extLst>
               <a:ext uri="{FF2B5EF4-FFF2-40B4-BE49-F238E27FC236}">
-                <a16:creationId xmlns:a16="http://schemas.microsoft.com/office/drawing/2014/main" id="{E98E8F67-C68F-4893-8C8F-A37CDB914C54}"/>
+                <a16:creationId xmlns:a16="http://schemas.microsoft.com/office/drawing/2014/main" id="{7B76A3B4-76B0-4521-BFC9-49096DB8FD90}"/>
               </a:ext>
             </a:extLst>
           </p:cNvPr>
@@ -5546,65 +5835,87 @@
           <p:nvPr/>
         </p:nvPicPr>
         <p:blipFill>
-          <a:blip r:embed="rId2"/>
+          <a:blip r:embed="rId3"/>
           <a:stretch>
             <a:fillRect/>
           </a:stretch>
         </p:blipFill>
         <p:spPr>
           <a:xfrm>
-            <a:off x="317421" y="1168400"/>
-            <a:ext cx="4425425" cy="3316310"/>
+            <a:off x="179310" y="1139261"/>
+            <a:ext cx="4392690" cy="1126920"/>
           </a:xfrm>
           <a:prstGeom prst="rect">
             <a:avLst/>
           </a:prstGeom>
         </p:spPr>
       </p:pic>
-      <p:sp>
-        <p:nvSpPr>
-          <p:cNvPr id="6" name="ZoneTexte 5">
+      <p:pic>
+        <p:nvPicPr>
+          <p:cNvPr id="10" name="Image 9">
             <a:extLst>
               <a:ext uri="{FF2B5EF4-FFF2-40B4-BE49-F238E27FC236}">
-                <a16:creationId xmlns:a16="http://schemas.microsoft.com/office/drawing/2014/main" id="{D8F7D0BA-BE62-4505-8065-6EA8579FBE5A}"/>
+                <a16:creationId xmlns:a16="http://schemas.microsoft.com/office/drawing/2014/main" id="{2BBADFE1-709C-4451-B48F-A301E8F45A7F}"/>
               </a:ext>
             </a:extLst>
           </p:cNvPr>
-          <p:cNvSpPr txBox="1"/>
+          <p:cNvPicPr>
+            <a:picLocks noChangeAspect="1"/>
+          </p:cNvPicPr>
           <p:nvPr/>
-        </p:nvSpPr>
-        <p:spPr>
-          <a:xfrm>
-            <a:off x="5332033" y="1531034"/>
-            <a:ext cx="3448050" cy="646331"/>
+        </p:nvPicPr>
+        <p:blipFill>
+          <a:blip r:embed="rId4"/>
+          <a:stretch>
+            <a:fillRect/>
+          </a:stretch>
+        </p:blipFill>
+        <p:spPr>
+          <a:xfrm>
+            <a:off x="197663" y="2500302"/>
+            <a:ext cx="3677163" cy="142895"/>
           </a:xfrm>
           <a:prstGeom prst="rect">
             <a:avLst/>
           </a:prstGeom>
-          <a:noFill/>
-        </p:spPr>
-        <p:txBody>
-          <a:bodyPr wrap="square" rtlCol="0">
-            <a:spAutoFit/>
-          </a:bodyPr>
-          <a:lstStyle/>
-          <a:p>
-            <a:r>
-              <a:rPr lang="fr-FR" dirty="0">
-                <a:latin typeface="Segoe UI Semilight" panose="020B0402040204020203" pitchFamily="34" charset="0"/>
-                <a:cs typeface="Segoe UI Semilight" panose="020B0402040204020203" pitchFamily="34" charset="0"/>
-              </a:rPr>
-              <a:t>Actualisation automatique de la taille des ennemis et du vaisseau</a:t>
-            </a:r>
-          </a:p>
-        </p:txBody>
-      </p:sp>
-      <p:sp>
-        <p:nvSpPr>
-          <p:cNvPr id="7" name="Arc 6">
+        </p:spPr>
+      </p:pic>
+      <p:pic>
+        <p:nvPicPr>
+          <p:cNvPr id="12" name="Image 11">
             <a:extLst>
               <a:ext uri="{FF2B5EF4-FFF2-40B4-BE49-F238E27FC236}">
-                <a16:creationId xmlns:a16="http://schemas.microsoft.com/office/drawing/2014/main" id="{81C788E2-5121-48BC-91B2-FEAC8B08DCD3}"/>
+                <a16:creationId xmlns:a16="http://schemas.microsoft.com/office/drawing/2014/main" id="{4A85E829-C25A-4ECE-A185-D6DE89208119}"/>
+              </a:ext>
+            </a:extLst>
+          </p:cNvPr>
+          <p:cNvPicPr>
+            <a:picLocks noChangeAspect="1"/>
+          </p:cNvPicPr>
+          <p:nvPr/>
+        </p:nvPicPr>
+        <p:blipFill>
+          <a:blip r:embed="rId5"/>
+          <a:stretch>
+            <a:fillRect/>
+          </a:stretch>
+        </p:blipFill>
+        <p:spPr>
+          <a:xfrm>
+            <a:off x="179310" y="3028065"/>
+            <a:ext cx="3487768" cy="1904911"/>
+          </a:xfrm>
+          <a:prstGeom prst="rect">
+            <a:avLst/>
+          </a:prstGeom>
+        </p:spPr>
+      </p:pic>
+      <p:sp>
+        <p:nvSpPr>
+          <p:cNvPr id="13" name="Arc 12">
+            <a:extLst>
+              <a:ext uri="{FF2B5EF4-FFF2-40B4-BE49-F238E27FC236}">
+                <a16:creationId xmlns:a16="http://schemas.microsoft.com/office/drawing/2014/main" id="{8B011D02-6B6C-4CA1-B39C-5D43108F25DD}"/>
               </a:ext>
             </a:extLst>
           </p:cNvPr>
@@ -5613,13 +5924,13 @@
         </p:nvSpPr>
         <p:spPr>
           <a:xfrm>
-            <a:off x="4694617" y="1377950"/>
-            <a:ext cx="216504" cy="990600"/>
+            <a:off x="4619999" y="857667"/>
+            <a:ext cx="315071" cy="1408514"/>
           </a:xfrm>
           <a:prstGeom prst="arc">
             <a:avLst>
               <a:gd name="adj1" fmla="val 16200000"/>
-              <a:gd name="adj2" fmla="val 5252065"/>
+              <a:gd name="adj2" fmla="val 5487048"/>
             </a:avLst>
           </a:prstGeom>
         </p:spPr>
@@ -5648,10 +5959,10 @@
       </p:sp>
       <p:sp>
         <p:nvSpPr>
-          <p:cNvPr id="8" name="Flèche : droite 7">
+          <p:cNvPr id="14" name="Flèche : droite 13">
             <a:extLst>
               <a:ext uri="{FF2B5EF4-FFF2-40B4-BE49-F238E27FC236}">
-                <a16:creationId xmlns:a16="http://schemas.microsoft.com/office/drawing/2014/main" id="{E7633119-F7D4-4628-9197-59BEA784FCFB}"/>
+                <a16:creationId xmlns:a16="http://schemas.microsoft.com/office/drawing/2014/main" id="{74953C55-D2F0-4374-91FA-924F73AE9BD2}"/>
               </a:ext>
             </a:extLst>
           </p:cNvPr>
@@ -5660,8 +5971,8 @@
         </p:nvSpPr>
         <p:spPr>
           <a:xfrm>
-            <a:off x="4972050" y="1682750"/>
-            <a:ext cx="285750" cy="342900"/>
+            <a:off x="5058898" y="1361053"/>
+            <a:ext cx="380437" cy="401741"/>
           </a:xfrm>
           <a:prstGeom prst="rightArrow">
             <a:avLst/>
@@ -5692,10 +6003,48 @@
       </p:sp>
       <p:sp>
         <p:nvSpPr>
-          <p:cNvPr id="9" name="Arc 8">
+          <p:cNvPr id="15" name="ZoneTexte 14">
             <a:extLst>
               <a:ext uri="{FF2B5EF4-FFF2-40B4-BE49-F238E27FC236}">
-                <a16:creationId xmlns:a16="http://schemas.microsoft.com/office/drawing/2014/main" id="{CE871637-BF16-4B7A-BF28-E94AC75030AA}"/>
+                <a16:creationId xmlns:a16="http://schemas.microsoft.com/office/drawing/2014/main" id="{7965C026-DF12-469E-A4FF-DAA787A5CEC5}"/>
+              </a:ext>
+            </a:extLst>
+          </p:cNvPr>
+          <p:cNvSpPr txBox="1"/>
+          <p:nvPr/>
+        </p:nvSpPr>
+        <p:spPr>
+          <a:xfrm>
+            <a:off x="5895023" y="1238757"/>
+            <a:ext cx="2879183" cy="646331"/>
+          </a:xfrm>
+          <a:prstGeom prst="rect">
+            <a:avLst/>
+          </a:prstGeom>
+          <a:noFill/>
+        </p:spPr>
+        <p:txBody>
+          <a:bodyPr wrap="square" rtlCol="0">
+            <a:spAutoFit/>
+          </a:bodyPr>
+          <a:lstStyle/>
+          <a:p>
+            <a:r>
+              <a:rPr lang="fr-FR" dirty="0">
+                <a:latin typeface="Segoe UI Semilight" panose="020B0402040204020203" pitchFamily="34" charset="0"/>
+                <a:cs typeface="Segoe UI Semilight" panose="020B0402040204020203" pitchFamily="34" charset="0"/>
+              </a:rPr>
+              <a:t>Importation de la librairie et initialisation des barres</a:t>
+            </a:r>
+          </a:p>
+        </p:txBody>
+      </p:sp>
+      <p:sp>
+        <p:nvSpPr>
+          <p:cNvPr id="16" name="Flèche : droite 15">
+            <a:extLst>
+              <a:ext uri="{FF2B5EF4-FFF2-40B4-BE49-F238E27FC236}">
+                <a16:creationId xmlns:a16="http://schemas.microsoft.com/office/drawing/2014/main" id="{47771C2A-DAF4-48C5-89FA-9488A94E04E8}"/>
               </a:ext>
             </a:extLst>
           </p:cNvPr>
@@ -5704,55 +6053,8 @@
         </p:nvSpPr>
         <p:spPr>
           <a:xfrm>
-            <a:off x="4694617" y="2429568"/>
-            <a:ext cx="216504" cy="1374082"/>
-          </a:xfrm>
-          <a:prstGeom prst="arc">
-            <a:avLst>
-              <a:gd name="adj1" fmla="val 16200000"/>
-              <a:gd name="adj2" fmla="val 5252065"/>
-            </a:avLst>
-          </a:prstGeom>
-        </p:spPr>
-        <p:style>
-          <a:lnRef idx="2">
-            <a:schemeClr val="accent1"/>
-          </a:lnRef>
-          <a:fillRef idx="0">
-            <a:schemeClr val="accent1"/>
-          </a:fillRef>
-          <a:effectRef idx="1">
-            <a:schemeClr val="accent1"/>
-          </a:effectRef>
-          <a:fontRef idx="minor">
-            <a:schemeClr val="tx1"/>
-          </a:fontRef>
-        </p:style>
-        <p:txBody>
-          <a:bodyPr rtlCol="0" anchor="ctr"/>
-          <a:lstStyle/>
-          <a:p>
-            <a:pPr algn="ctr"/>
-            <a:endParaRPr lang="fr-FR"/>
-          </a:p>
-        </p:txBody>
-      </p:sp>
-      <p:sp>
-        <p:nvSpPr>
-          <p:cNvPr id="10" name="Flèche : droite 9">
-            <a:extLst>
-              <a:ext uri="{FF2B5EF4-FFF2-40B4-BE49-F238E27FC236}">
-                <a16:creationId xmlns:a16="http://schemas.microsoft.com/office/drawing/2014/main" id="{535FFAE8-9FEB-44CC-8655-66D2536236BE}"/>
-              </a:ext>
-            </a:extLst>
-          </p:cNvPr>
-          <p:cNvSpPr/>
-          <p:nvPr/>
-        </p:nvSpPr>
-        <p:spPr>
-          <a:xfrm>
-            <a:off x="4972050" y="2734368"/>
-            <a:ext cx="285750" cy="342900"/>
+            <a:off x="4235820" y="2372569"/>
+            <a:ext cx="1203515" cy="401741"/>
           </a:xfrm>
           <a:prstGeom prst="rightArrow">
             <a:avLst/>
@@ -5783,10 +6085,10 @@
       </p:sp>
       <p:sp>
         <p:nvSpPr>
-          <p:cNvPr id="11" name="ZoneTexte 10">
+          <p:cNvPr id="17" name="ZoneTexte 16">
             <a:extLst>
               <a:ext uri="{FF2B5EF4-FFF2-40B4-BE49-F238E27FC236}">
-                <a16:creationId xmlns:a16="http://schemas.microsoft.com/office/drawing/2014/main" id="{B1EA9BC4-89DF-4570-9C2A-D105B22461AE}"/>
+                <a16:creationId xmlns:a16="http://schemas.microsoft.com/office/drawing/2014/main" id="{CC443031-3F97-4449-A77C-0B9FB68B9013}"/>
               </a:ext>
             </a:extLst>
           </p:cNvPr>
@@ -5795,8 +6097,8 @@
         </p:nvSpPr>
         <p:spPr>
           <a:xfrm>
-            <a:off x="5454650" y="2429568"/>
-            <a:ext cx="3325433" cy="923330"/>
+            <a:off x="5762065" y="2383892"/>
+            <a:ext cx="3321424" cy="646331"/>
           </a:xfrm>
           <a:prstGeom prst="rect">
             <a:avLst/>
@@ -5814,7 +6116,184 @@
                 <a:latin typeface="Segoe UI Semilight" panose="020B0402040204020203" pitchFamily="34" charset="0"/>
                 <a:cs typeface="Segoe UI Semilight" panose="020B0402040204020203" pitchFamily="34" charset="0"/>
               </a:rPr>
-              <a:t>Réglage des vitesses, du volume et de la chance d’apparition des ennemis</a:t>
+              <a:t>Affichage des barres lors de l’affichage du menu des options</a:t>
+            </a:r>
+          </a:p>
+        </p:txBody>
+      </p:sp>
+      <p:sp>
+        <p:nvSpPr>
+          <p:cNvPr id="18" name="Flèche : droite 17">
+            <a:extLst>
+              <a:ext uri="{FF2B5EF4-FFF2-40B4-BE49-F238E27FC236}">
+                <a16:creationId xmlns:a16="http://schemas.microsoft.com/office/drawing/2014/main" id="{5C1DBF73-913E-4811-80A1-E30A1C542757}"/>
+              </a:ext>
+            </a:extLst>
+          </p:cNvPr>
+          <p:cNvSpPr/>
+          <p:nvPr/>
+        </p:nvSpPr>
+        <p:spPr>
+          <a:xfrm>
+            <a:off x="3859866" y="3779649"/>
+            <a:ext cx="1579469" cy="401741"/>
+          </a:xfrm>
+          <a:prstGeom prst="rightArrow">
+            <a:avLst/>
+          </a:prstGeom>
+        </p:spPr>
+        <p:style>
+          <a:lnRef idx="1">
+            <a:schemeClr val="accent1"/>
+          </a:lnRef>
+          <a:fillRef idx="3">
+            <a:schemeClr val="accent1"/>
+          </a:fillRef>
+          <a:effectRef idx="2">
+            <a:schemeClr val="accent1"/>
+          </a:effectRef>
+          <a:fontRef idx="minor">
+            <a:schemeClr val="lt1"/>
+          </a:fontRef>
+        </p:style>
+        <p:txBody>
+          <a:bodyPr rtlCol="0" anchor="ctr"/>
+          <a:lstStyle/>
+          <a:p>
+            <a:pPr algn="ctr"/>
+            <a:endParaRPr lang="fr-FR"/>
+          </a:p>
+        </p:txBody>
+      </p:sp>
+      <p:sp>
+        <p:nvSpPr>
+          <p:cNvPr id="19" name="ZoneTexte 18">
+            <a:extLst>
+              <a:ext uri="{FF2B5EF4-FFF2-40B4-BE49-F238E27FC236}">
+                <a16:creationId xmlns:a16="http://schemas.microsoft.com/office/drawing/2014/main" id="{06565327-49DA-4DF3-8C5A-9FC3E80C3752}"/>
+              </a:ext>
+            </a:extLst>
+          </p:cNvPr>
+          <p:cNvSpPr txBox="1"/>
+          <p:nvPr/>
+        </p:nvSpPr>
+        <p:spPr>
+          <a:xfrm>
+            <a:off x="5647765" y="3294529"/>
+            <a:ext cx="3316925" cy="1477328"/>
+          </a:xfrm>
+          <a:prstGeom prst="rect">
+            <a:avLst/>
+          </a:prstGeom>
+          <a:noFill/>
+        </p:spPr>
+        <p:txBody>
+          <a:bodyPr wrap="square" rtlCol="0">
+            <a:spAutoFit/>
+          </a:bodyPr>
+          <a:lstStyle/>
+          <a:p>
+            <a:r>
+              <a:rPr lang="fr-FR" dirty="0">
+                <a:latin typeface="Segoe UI Semilight" panose="020B0402040204020203" pitchFamily="34" charset="0"/>
+                <a:cs typeface="Segoe UI Semilight" panose="020B0402040204020203" pitchFamily="34" charset="0"/>
+              </a:rPr>
+              <a:t>Récupération des valeurs : </a:t>
+            </a:r>
+          </a:p>
+          <a:p>
+            <a:pPr marL="285750" indent="-285750">
+              <a:buFontTx/>
+              <a:buChar char="-"/>
+            </a:pPr>
+            <a:r>
+              <a:rPr lang="fr-FR" dirty="0" err="1">
+                <a:latin typeface="Segoe UI Semilight" panose="020B0402040204020203" pitchFamily="34" charset="0"/>
+                <a:cs typeface="Segoe UI Semilight" panose="020B0402040204020203" pitchFamily="34" charset="0"/>
+              </a:rPr>
+              <a:t>tEnnemis</a:t>
+            </a:r>
+            <a:r>
+              <a:rPr lang="fr-FR" dirty="0">
+                <a:latin typeface="Segoe UI Semilight" panose="020B0402040204020203" pitchFamily="34" charset="0"/>
+                <a:cs typeface="Segoe UI Semilight" panose="020B0402040204020203" pitchFamily="34" charset="0"/>
+              </a:rPr>
+              <a:t> et </a:t>
+            </a:r>
+            <a:r>
+              <a:rPr lang="fr-FR" dirty="0" err="1">
+                <a:latin typeface="Segoe UI Semilight" panose="020B0402040204020203" pitchFamily="34" charset="0"/>
+                <a:cs typeface="Segoe UI Semilight" panose="020B0402040204020203" pitchFamily="34" charset="0"/>
+              </a:rPr>
+              <a:t>tVaisseau</a:t>
+            </a:r>
+            <a:r>
+              <a:rPr lang="fr-FR" dirty="0">
+                <a:latin typeface="Segoe UI Semilight" panose="020B0402040204020203" pitchFamily="34" charset="0"/>
+                <a:cs typeface="Segoe UI Semilight" panose="020B0402040204020203" pitchFamily="34" charset="0"/>
+              </a:rPr>
+              <a:t> pour afficher un aperçu</a:t>
+            </a:r>
+          </a:p>
+          <a:p>
+            <a:pPr marL="285750" indent="-285750">
+              <a:buFontTx/>
+              <a:buChar char="-"/>
+            </a:pPr>
+            <a:endParaRPr lang="fr-FR" dirty="0">
+              <a:latin typeface="Segoe UI Semilight" panose="020B0402040204020203" pitchFamily="34" charset="0"/>
+              <a:cs typeface="Segoe UI Semilight" panose="020B0402040204020203" pitchFamily="34" charset="0"/>
+            </a:endParaRPr>
+          </a:p>
+          <a:p>
+            <a:pPr marL="285750" indent="-285750">
+              <a:buFontTx/>
+              <a:buChar char="-"/>
+            </a:pPr>
+            <a:r>
+              <a:rPr lang="fr-FR" dirty="0">
+                <a:latin typeface="Segoe UI Semilight" panose="020B0402040204020203" pitchFamily="34" charset="0"/>
+                <a:cs typeface="Segoe UI Semilight" panose="020B0402040204020203" pitchFamily="34" charset="0"/>
+              </a:rPr>
+              <a:t>Du volume</a:t>
+            </a:r>
+          </a:p>
+        </p:txBody>
+      </p:sp>
+      <p:sp>
+        <p:nvSpPr>
+          <p:cNvPr id="20" name="ZoneTexte 19">
+            <a:extLst>
+              <a:ext uri="{FF2B5EF4-FFF2-40B4-BE49-F238E27FC236}">
+                <a16:creationId xmlns:a16="http://schemas.microsoft.com/office/drawing/2014/main" id="{DCD353B4-4B2E-4943-93BC-FAB5B89C6A9F}"/>
+              </a:ext>
+            </a:extLst>
+          </p:cNvPr>
+          <p:cNvSpPr txBox="1"/>
+          <p:nvPr/>
+        </p:nvSpPr>
+        <p:spPr>
+          <a:xfrm>
+            <a:off x="5762065" y="1949824"/>
+            <a:ext cx="3107382" cy="369332"/>
+          </a:xfrm>
+          <a:prstGeom prst="rect">
+            <a:avLst/>
+          </a:prstGeom>
+          <a:noFill/>
+        </p:spPr>
+        <p:txBody>
+          <a:bodyPr wrap="square" rtlCol="0">
+            <a:spAutoFit/>
+          </a:bodyPr>
+          <a:lstStyle/>
+          <a:p>
+            <a:r>
+              <a:rPr lang="fr-FR" b="1" u="sng" dirty="0">
+                <a:latin typeface="Segoe UI Semilight" panose="020B0402040204020203" pitchFamily="34" charset="0"/>
+                <a:cs typeface="Segoe UI Semilight" panose="020B0402040204020203" pitchFamily="34" charset="0"/>
+              </a:rPr>
+              <a:t>A chaque actualisation :</a:t>
             </a:r>
           </a:p>
         </p:txBody>
@@ -5822,7 +6301,7 @@
     </p:spTree>
     <p:extLst>
       <p:ext uri="{BB962C8B-B14F-4D97-AF65-F5344CB8AC3E}">
-        <p14:creationId xmlns:p14="http://schemas.microsoft.com/office/powerpoint/2010/main" val="79871001"/>
+        <p14:creationId xmlns:p14="http://schemas.microsoft.com/office/powerpoint/2010/main" val="546876735"/>
       </p:ext>
     </p:extLst>
   </p:cSld>
@@ -5854,6 +6333,387 @@
           <p:cNvPr id="2" name="Espace réservé du texte 1">
             <a:extLst>
               <a:ext uri="{FF2B5EF4-FFF2-40B4-BE49-F238E27FC236}">
+                <a16:creationId xmlns:a16="http://schemas.microsoft.com/office/drawing/2014/main" id="{592FF3E2-BEA2-48EF-904E-BA12E0A1A7DE}"/>
+              </a:ext>
+            </a:extLst>
+          </p:cNvPr>
+          <p:cNvSpPr>
+            <a:spLocks noGrp="1"/>
+          </p:cNvSpPr>
+          <p:nvPr>
+            <p:ph type="body" sz="quarter" idx="13"/>
+          </p:nvPr>
+        </p:nvSpPr>
+        <p:spPr>
+          <a:xfrm>
+            <a:off x="317421" y="358311"/>
+            <a:ext cx="3714829" cy="272821"/>
+          </a:xfrm>
+        </p:spPr>
+        <p:txBody>
+          <a:bodyPr>
+            <a:normAutofit/>
+          </a:bodyPr>
+          <a:lstStyle/>
+          <a:p>
+            <a:r>
+              <a:rPr lang="fr-FR" dirty="0"/>
+              <a:t>Menu des options et barres de réglage</a:t>
+            </a:r>
+          </a:p>
+        </p:txBody>
+      </p:sp>
+      <p:sp>
+        <p:nvSpPr>
+          <p:cNvPr id="3" name="Espace réservé du texte 2">
+            <a:extLst>
+              <a:ext uri="{FF2B5EF4-FFF2-40B4-BE49-F238E27FC236}">
+                <a16:creationId xmlns:a16="http://schemas.microsoft.com/office/drawing/2014/main" id="{87BC9DCC-E82B-49D5-9980-2FF7CDC00578}"/>
+              </a:ext>
+            </a:extLst>
+          </p:cNvPr>
+          <p:cNvSpPr>
+            <a:spLocks noGrp="1"/>
+          </p:cNvSpPr>
+          <p:nvPr>
+            <p:ph type="body" sz="quarter" idx="14"/>
+          </p:nvPr>
+        </p:nvSpPr>
+        <p:spPr/>
+        <p:txBody>
+          <a:bodyPr/>
+          <a:lstStyle/>
+          <a:p>
+            <a:r>
+              <a:rPr lang="fr-FR" dirty="0"/>
+              <a:t>Menus</a:t>
+            </a:r>
+          </a:p>
+        </p:txBody>
+      </p:sp>
+      <p:pic>
+        <p:nvPicPr>
+          <p:cNvPr id="5" name="Image 4">
+            <a:extLst>
+              <a:ext uri="{FF2B5EF4-FFF2-40B4-BE49-F238E27FC236}">
+                <a16:creationId xmlns:a16="http://schemas.microsoft.com/office/drawing/2014/main" id="{E98E8F67-C68F-4893-8C8F-A37CDB914C54}"/>
+              </a:ext>
+            </a:extLst>
+          </p:cNvPr>
+          <p:cNvPicPr>
+            <a:picLocks noChangeAspect="1"/>
+          </p:cNvPicPr>
+          <p:nvPr/>
+        </p:nvPicPr>
+        <p:blipFill>
+          <a:blip r:embed="rId2"/>
+          <a:stretch>
+            <a:fillRect/>
+          </a:stretch>
+        </p:blipFill>
+        <p:spPr>
+          <a:xfrm>
+            <a:off x="317421" y="1168400"/>
+            <a:ext cx="4425425" cy="3316310"/>
+          </a:xfrm>
+          <a:prstGeom prst="rect">
+            <a:avLst/>
+          </a:prstGeom>
+        </p:spPr>
+      </p:pic>
+      <p:sp>
+        <p:nvSpPr>
+          <p:cNvPr id="6" name="ZoneTexte 5">
+            <a:extLst>
+              <a:ext uri="{FF2B5EF4-FFF2-40B4-BE49-F238E27FC236}">
+                <a16:creationId xmlns:a16="http://schemas.microsoft.com/office/drawing/2014/main" id="{D8F7D0BA-BE62-4505-8065-6EA8579FBE5A}"/>
+              </a:ext>
+            </a:extLst>
+          </p:cNvPr>
+          <p:cNvSpPr txBox="1"/>
+          <p:nvPr/>
+        </p:nvSpPr>
+        <p:spPr>
+          <a:xfrm>
+            <a:off x="5332033" y="1531034"/>
+            <a:ext cx="3448050" cy="646331"/>
+          </a:xfrm>
+          <a:prstGeom prst="rect">
+            <a:avLst/>
+          </a:prstGeom>
+          <a:noFill/>
+        </p:spPr>
+        <p:txBody>
+          <a:bodyPr wrap="square" rtlCol="0">
+            <a:spAutoFit/>
+          </a:bodyPr>
+          <a:lstStyle/>
+          <a:p>
+            <a:r>
+              <a:rPr lang="fr-FR" dirty="0">
+                <a:latin typeface="Segoe UI Semilight" panose="020B0402040204020203" pitchFamily="34" charset="0"/>
+                <a:cs typeface="Segoe UI Semilight" panose="020B0402040204020203" pitchFamily="34" charset="0"/>
+              </a:rPr>
+              <a:t>Actualisation automatique de la taille des ennemis et du vaisseau</a:t>
+            </a:r>
+          </a:p>
+        </p:txBody>
+      </p:sp>
+      <p:sp>
+        <p:nvSpPr>
+          <p:cNvPr id="7" name="Arc 6">
+            <a:extLst>
+              <a:ext uri="{FF2B5EF4-FFF2-40B4-BE49-F238E27FC236}">
+                <a16:creationId xmlns:a16="http://schemas.microsoft.com/office/drawing/2014/main" id="{81C788E2-5121-48BC-91B2-FEAC8B08DCD3}"/>
+              </a:ext>
+            </a:extLst>
+          </p:cNvPr>
+          <p:cNvSpPr/>
+          <p:nvPr/>
+        </p:nvSpPr>
+        <p:spPr>
+          <a:xfrm>
+            <a:off x="4694617" y="1377950"/>
+            <a:ext cx="216504" cy="990600"/>
+          </a:xfrm>
+          <a:prstGeom prst="arc">
+            <a:avLst>
+              <a:gd name="adj1" fmla="val 16200000"/>
+              <a:gd name="adj2" fmla="val 5252065"/>
+            </a:avLst>
+          </a:prstGeom>
+        </p:spPr>
+        <p:style>
+          <a:lnRef idx="2">
+            <a:schemeClr val="accent1"/>
+          </a:lnRef>
+          <a:fillRef idx="0">
+            <a:schemeClr val="accent1"/>
+          </a:fillRef>
+          <a:effectRef idx="1">
+            <a:schemeClr val="accent1"/>
+          </a:effectRef>
+          <a:fontRef idx="minor">
+            <a:schemeClr val="tx1"/>
+          </a:fontRef>
+        </p:style>
+        <p:txBody>
+          <a:bodyPr rtlCol="0" anchor="ctr"/>
+          <a:lstStyle/>
+          <a:p>
+            <a:pPr algn="ctr"/>
+            <a:endParaRPr lang="fr-FR"/>
+          </a:p>
+        </p:txBody>
+      </p:sp>
+      <p:sp>
+        <p:nvSpPr>
+          <p:cNvPr id="8" name="Flèche : droite 7">
+            <a:extLst>
+              <a:ext uri="{FF2B5EF4-FFF2-40B4-BE49-F238E27FC236}">
+                <a16:creationId xmlns:a16="http://schemas.microsoft.com/office/drawing/2014/main" id="{E7633119-F7D4-4628-9197-59BEA784FCFB}"/>
+              </a:ext>
+            </a:extLst>
+          </p:cNvPr>
+          <p:cNvSpPr/>
+          <p:nvPr/>
+        </p:nvSpPr>
+        <p:spPr>
+          <a:xfrm>
+            <a:off x="4972050" y="1682750"/>
+            <a:ext cx="285750" cy="342900"/>
+          </a:xfrm>
+          <a:prstGeom prst="rightArrow">
+            <a:avLst/>
+          </a:prstGeom>
+        </p:spPr>
+        <p:style>
+          <a:lnRef idx="1">
+            <a:schemeClr val="accent1"/>
+          </a:lnRef>
+          <a:fillRef idx="3">
+            <a:schemeClr val="accent1"/>
+          </a:fillRef>
+          <a:effectRef idx="2">
+            <a:schemeClr val="accent1"/>
+          </a:effectRef>
+          <a:fontRef idx="minor">
+            <a:schemeClr val="lt1"/>
+          </a:fontRef>
+        </p:style>
+        <p:txBody>
+          <a:bodyPr rtlCol="0" anchor="ctr"/>
+          <a:lstStyle/>
+          <a:p>
+            <a:pPr algn="ctr"/>
+            <a:endParaRPr lang="fr-FR"/>
+          </a:p>
+        </p:txBody>
+      </p:sp>
+      <p:sp>
+        <p:nvSpPr>
+          <p:cNvPr id="9" name="Arc 8">
+            <a:extLst>
+              <a:ext uri="{FF2B5EF4-FFF2-40B4-BE49-F238E27FC236}">
+                <a16:creationId xmlns:a16="http://schemas.microsoft.com/office/drawing/2014/main" id="{CE871637-BF16-4B7A-BF28-E94AC75030AA}"/>
+              </a:ext>
+            </a:extLst>
+          </p:cNvPr>
+          <p:cNvSpPr/>
+          <p:nvPr/>
+        </p:nvSpPr>
+        <p:spPr>
+          <a:xfrm>
+            <a:off x="4694617" y="2429568"/>
+            <a:ext cx="216504" cy="1374082"/>
+          </a:xfrm>
+          <a:prstGeom prst="arc">
+            <a:avLst>
+              <a:gd name="adj1" fmla="val 16200000"/>
+              <a:gd name="adj2" fmla="val 5252065"/>
+            </a:avLst>
+          </a:prstGeom>
+        </p:spPr>
+        <p:style>
+          <a:lnRef idx="2">
+            <a:schemeClr val="accent1"/>
+          </a:lnRef>
+          <a:fillRef idx="0">
+            <a:schemeClr val="accent1"/>
+          </a:fillRef>
+          <a:effectRef idx="1">
+            <a:schemeClr val="accent1"/>
+          </a:effectRef>
+          <a:fontRef idx="minor">
+            <a:schemeClr val="tx1"/>
+          </a:fontRef>
+        </p:style>
+        <p:txBody>
+          <a:bodyPr rtlCol="0" anchor="ctr"/>
+          <a:lstStyle/>
+          <a:p>
+            <a:pPr algn="ctr"/>
+            <a:endParaRPr lang="fr-FR"/>
+          </a:p>
+        </p:txBody>
+      </p:sp>
+      <p:sp>
+        <p:nvSpPr>
+          <p:cNvPr id="10" name="Flèche : droite 9">
+            <a:extLst>
+              <a:ext uri="{FF2B5EF4-FFF2-40B4-BE49-F238E27FC236}">
+                <a16:creationId xmlns:a16="http://schemas.microsoft.com/office/drawing/2014/main" id="{535FFAE8-9FEB-44CC-8655-66D2536236BE}"/>
+              </a:ext>
+            </a:extLst>
+          </p:cNvPr>
+          <p:cNvSpPr/>
+          <p:nvPr/>
+        </p:nvSpPr>
+        <p:spPr>
+          <a:xfrm>
+            <a:off x="4972050" y="2734368"/>
+            <a:ext cx="285750" cy="342900"/>
+          </a:xfrm>
+          <a:prstGeom prst="rightArrow">
+            <a:avLst/>
+          </a:prstGeom>
+        </p:spPr>
+        <p:style>
+          <a:lnRef idx="1">
+            <a:schemeClr val="accent1"/>
+          </a:lnRef>
+          <a:fillRef idx="3">
+            <a:schemeClr val="accent1"/>
+          </a:fillRef>
+          <a:effectRef idx="2">
+            <a:schemeClr val="accent1"/>
+          </a:effectRef>
+          <a:fontRef idx="minor">
+            <a:schemeClr val="lt1"/>
+          </a:fontRef>
+        </p:style>
+        <p:txBody>
+          <a:bodyPr rtlCol="0" anchor="ctr"/>
+          <a:lstStyle/>
+          <a:p>
+            <a:pPr algn="ctr"/>
+            <a:endParaRPr lang="fr-FR"/>
+          </a:p>
+        </p:txBody>
+      </p:sp>
+      <p:sp>
+        <p:nvSpPr>
+          <p:cNvPr id="11" name="ZoneTexte 10">
+            <a:extLst>
+              <a:ext uri="{FF2B5EF4-FFF2-40B4-BE49-F238E27FC236}">
+                <a16:creationId xmlns:a16="http://schemas.microsoft.com/office/drawing/2014/main" id="{B1EA9BC4-89DF-4570-9C2A-D105B22461AE}"/>
+              </a:ext>
+            </a:extLst>
+          </p:cNvPr>
+          <p:cNvSpPr txBox="1"/>
+          <p:nvPr/>
+        </p:nvSpPr>
+        <p:spPr>
+          <a:xfrm>
+            <a:off x="5454650" y="2429568"/>
+            <a:ext cx="3325433" cy="923330"/>
+          </a:xfrm>
+          <a:prstGeom prst="rect">
+            <a:avLst/>
+          </a:prstGeom>
+          <a:noFill/>
+        </p:spPr>
+        <p:txBody>
+          <a:bodyPr wrap="square" rtlCol="0">
+            <a:spAutoFit/>
+          </a:bodyPr>
+          <a:lstStyle/>
+          <a:p>
+            <a:r>
+              <a:rPr lang="fr-FR" dirty="0">
+                <a:latin typeface="Segoe UI Semilight" panose="020B0402040204020203" pitchFamily="34" charset="0"/>
+                <a:cs typeface="Segoe UI Semilight" panose="020B0402040204020203" pitchFamily="34" charset="0"/>
+              </a:rPr>
+              <a:t>Réglage des vitesses, du volume et de la chance d’apparition des ennemis</a:t>
+            </a:r>
+          </a:p>
+        </p:txBody>
+      </p:sp>
+    </p:spTree>
+    <p:extLst>
+      <p:ext uri="{BB962C8B-B14F-4D97-AF65-F5344CB8AC3E}">
+        <p14:creationId xmlns:p14="http://schemas.microsoft.com/office/powerpoint/2010/main" val="79871001"/>
+      </p:ext>
+    </p:extLst>
+  </p:cSld>
+  <p:clrMapOvr>
+    <a:masterClrMapping/>
+  </p:clrMapOvr>
+</p:sld>
+</file>
+
+<file path=ppt/slides/slide16.xml><?xml version="1.0" encoding="utf-8"?>
+<p:sld xmlns:a="http://schemas.openxmlformats.org/drawingml/2006/main" xmlns:r="http://schemas.openxmlformats.org/officeDocument/2006/relationships" xmlns:p="http://schemas.openxmlformats.org/presentationml/2006/main">
+  <p:cSld>
+    <p:spTree>
+      <p:nvGrpSpPr>
+        <p:cNvPr id="1" name=""/>
+        <p:cNvGrpSpPr/>
+        <p:nvPr/>
+      </p:nvGrpSpPr>
+      <p:grpSpPr>
+        <a:xfrm>
+          <a:off x="0" y="0"/>
+          <a:ext cx="0" cy="0"/>
+          <a:chOff x="0" y="0"/>
+          <a:chExt cx="0" cy="0"/>
+        </a:xfrm>
+      </p:grpSpPr>
+      <p:sp>
+        <p:nvSpPr>
+          <p:cNvPr id="2" name="Espace réservé du texte 1">
+            <a:extLst>
+              <a:ext uri="{FF2B5EF4-FFF2-40B4-BE49-F238E27FC236}">
                 <a16:creationId xmlns:a16="http://schemas.microsoft.com/office/drawing/2014/main" id="{BC675E1C-12D2-4045-823D-89B92FB90760}"/>
               </a:ext>
             </a:extLst>
@@ -5918,7 +6778,7 @@
 </p:sld>
 </file>
 
-<file path=ppt/slides/slide16.xml><?xml version="1.0" encoding="utf-8"?>
+<file path=ppt/slides/slide17.xml><?xml version="1.0" encoding="utf-8"?>
 <p:sld xmlns:a="http://schemas.openxmlformats.org/drawingml/2006/main" xmlns:r="http://schemas.openxmlformats.org/officeDocument/2006/relationships" xmlns:p="http://schemas.openxmlformats.org/presentationml/2006/main">
   <p:cSld>
     <p:spTree>
@@ -6617,7 +7477,7 @@
                 <a:latin typeface="Segoe UI Semilight" panose="020B0402040204020203" pitchFamily="34" charset="0"/>
                 <a:cs typeface="Segoe UI Semilight" panose="020B0402040204020203" pitchFamily="34" charset="0"/>
               </a:rPr>
-              <a:t>Gestion des menus : </a:t>
+              <a:t>Gestion / conception des menus : </a:t>
             </a:r>
             <a:r>
               <a:rPr lang="fr-FR" dirty="0">
@@ -7078,7 +7938,7 @@
           </p:nvPr>
         </p:nvPicPr>
         <p:blipFill>
-          <a:blip r:embed="rId2"/>
+          <a:blip r:embed="rId3"/>
           <a:stretch>
             <a:fillRect/>
           </a:stretch>

</xml_diff>